<commit_message>
fix two small typos in lecture #5
</commit_message>
<xml_diff>
--- a/classes/stats2016/Lecture05.pptx
+++ b/classes/stats2016/Lecture05.pptx
@@ -150,6 +150,22 @@
       </a:defRPr>
     </a:lvl9pPr>
   </p:defaultTextStyle>
+  <p:extLst>
+    <p:ext uri="{EFAFB233-063F-42B5-8137-9DF3F51BA10A}">
+      <p15:sldGuideLst xmlns:p15="http://schemas.microsoft.com/office/powerpoint/2012/main">
+        <p15:guide id="1" orient="horz" pos="2160">
+          <p15:clr>
+            <a:srgbClr val="A4A3A4"/>
+          </p15:clr>
+        </p15:guide>
+        <p15:guide id="2" pos="2880">
+          <p15:clr>
+            <a:srgbClr val="A4A3A4"/>
+          </p15:clr>
+        </p15:guide>
+      </p15:sldGuideLst>
+    </p:ext>
+  </p:extLst>
 </p:presentation>
 </file>
 
@@ -236,7 +252,7 @@
             <a:fld id="{56116F29-BB7A-49FE-BE2E-9DBA2ECB74D5}" type="datetimeFigureOut">
               <a:rPr lang="en-US" smtClean="0"/>
               <a:pPr/>
-              <a:t>1/26/2016</a:t>
+              <a:t>2/2/2016</a:t>
             </a:fld>
             <a:endParaRPr lang="en-US"/>
           </a:p>
@@ -405,6 +421,11 @@
         </p:txBody>
       </p:sp>
     </p:spTree>
+    <p:extLst>
+      <p:ext uri="{BB962C8B-B14F-4D97-AF65-F5344CB8AC3E}">
+        <p14:creationId xmlns:p14="http://schemas.microsoft.com/office/powerpoint/2010/main" val="1464734080"/>
+      </p:ext>
+    </p:extLst>
   </p:cSld>
   <p:clrMap bg1="lt1" tx1="dk1" bg2="lt2" tx2="dk2" accent1="accent1" accent2="accent2" accent3="accent3" accent4="accent4" accent5="accent5" accent6="accent6" hlink="hlink" folHlink="folHlink"/>
   <p:notesStyle>
@@ -577,6 +598,11 @@
         </p:txBody>
       </p:sp>
     </p:spTree>
+    <p:extLst>
+      <p:ext uri="{BB962C8B-B14F-4D97-AF65-F5344CB8AC3E}">
+        <p14:creationId xmlns:p14="http://schemas.microsoft.com/office/powerpoint/2010/main" val="2949841026"/>
+      </p:ext>
+    </p:extLst>
   </p:cSld>
   <p:clrMapOvr>
     <a:masterClrMapping/>
@@ -659,6 +685,11 @@
         </p:txBody>
       </p:sp>
     </p:spTree>
+    <p:extLst>
+      <p:ext uri="{BB962C8B-B14F-4D97-AF65-F5344CB8AC3E}">
+        <p14:creationId xmlns:p14="http://schemas.microsoft.com/office/powerpoint/2010/main" val="1228465436"/>
+      </p:ext>
+    </p:extLst>
   </p:cSld>
   <p:clrMapOvr>
     <a:masterClrMapping/>
@@ -741,6 +772,11 @@
         </p:txBody>
       </p:sp>
     </p:spTree>
+    <p:extLst>
+      <p:ext uri="{BB962C8B-B14F-4D97-AF65-F5344CB8AC3E}">
+        <p14:creationId xmlns:p14="http://schemas.microsoft.com/office/powerpoint/2010/main" val="405258550"/>
+      </p:ext>
+    </p:extLst>
   </p:cSld>
   <p:clrMapOvr>
     <a:masterClrMapping/>
@@ -823,6 +859,11 @@
         </p:txBody>
       </p:sp>
     </p:spTree>
+    <p:extLst>
+      <p:ext uri="{BB962C8B-B14F-4D97-AF65-F5344CB8AC3E}">
+        <p14:creationId xmlns:p14="http://schemas.microsoft.com/office/powerpoint/2010/main" val="1781504670"/>
+      </p:ext>
+    </p:extLst>
   </p:cSld>
   <p:clrMapOvr>
     <a:masterClrMapping/>
@@ -905,6 +946,11 @@
         </p:txBody>
       </p:sp>
     </p:spTree>
+    <p:extLst>
+      <p:ext uri="{BB962C8B-B14F-4D97-AF65-F5344CB8AC3E}">
+        <p14:creationId xmlns:p14="http://schemas.microsoft.com/office/powerpoint/2010/main" val="1420015115"/>
+      </p:ext>
+    </p:extLst>
   </p:cSld>
   <p:clrMapOvr>
     <a:masterClrMapping/>
@@ -987,6 +1033,11 @@
         </p:txBody>
       </p:sp>
     </p:spTree>
+    <p:extLst>
+      <p:ext uri="{BB962C8B-B14F-4D97-AF65-F5344CB8AC3E}">
+        <p14:creationId xmlns:p14="http://schemas.microsoft.com/office/powerpoint/2010/main" val="1438362075"/>
+      </p:ext>
+    </p:extLst>
   </p:cSld>
   <p:clrMapOvr>
     <a:masterClrMapping/>
@@ -1069,6 +1120,11 @@
         </p:txBody>
       </p:sp>
     </p:spTree>
+    <p:extLst>
+      <p:ext uri="{BB962C8B-B14F-4D97-AF65-F5344CB8AC3E}">
+        <p14:creationId xmlns:p14="http://schemas.microsoft.com/office/powerpoint/2010/main" val="3173927414"/>
+      </p:ext>
+    </p:extLst>
   </p:cSld>
   <p:clrMapOvr>
     <a:masterClrMapping/>
@@ -1151,6 +1207,11 @@
         </p:txBody>
       </p:sp>
     </p:spTree>
+    <p:extLst>
+      <p:ext uri="{BB962C8B-B14F-4D97-AF65-F5344CB8AC3E}">
+        <p14:creationId xmlns:p14="http://schemas.microsoft.com/office/powerpoint/2010/main" val="2532365147"/>
+      </p:ext>
+    </p:extLst>
   </p:cSld>
   <p:clrMapOvr>
     <a:masterClrMapping/>
@@ -1233,6 +1294,11 @@
         </p:txBody>
       </p:sp>
     </p:spTree>
+    <p:extLst>
+      <p:ext uri="{BB962C8B-B14F-4D97-AF65-F5344CB8AC3E}">
+        <p14:creationId xmlns:p14="http://schemas.microsoft.com/office/powerpoint/2010/main" val="3077768264"/>
+      </p:ext>
+    </p:extLst>
   </p:cSld>
   <p:clrMapOvr>
     <a:masterClrMapping/>
@@ -1315,6 +1381,11 @@
         </p:txBody>
       </p:sp>
     </p:spTree>
+    <p:extLst>
+      <p:ext uri="{BB962C8B-B14F-4D97-AF65-F5344CB8AC3E}">
+        <p14:creationId xmlns:p14="http://schemas.microsoft.com/office/powerpoint/2010/main" val="4211928966"/>
+      </p:ext>
+    </p:extLst>
   </p:cSld>
   <p:clrMapOvr>
     <a:masterClrMapping/>
@@ -1397,6 +1468,11 @@
         </p:txBody>
       </p:sp>
     </p:spTree>
+    <p:extLst>
+      <p:ext uri="{BB962C8B-B14F-4D97-AF65-F5344CB8AC3E}">
+        <p14:creationId xmlns:p14="http://schemas.microsoft.com/office/powerpoint/2010/main" val="614759083"/>
+      </p:ext>
+    </p:extLst>
   </p:cSld>
   <p:clrMapOvr>
     <a:masterClrMapping/>
@@ -1479,6 +1555,11 @@
         </p:txBody>
       </p:sp>
     </p:spTree>
+    <p:extLst>
+      <p:ext uri="{BB962C8B-B14F-4D97-AF65-F5344CB8AC3E}">
+        <p14:creationId xmlns:p14="http://schemas.microsoft.com/office/powerpoint/2010/main" val="100424755"/>
+      </p:ext>
+    </p:extLst>
   </p:cSld>
   <p:clrMapOvr>
     <a:masterClrMapping/>
@@ -1561,6 +1642,11 @@
         </p:txBody>
       </p:sp>
     </p:spTree>
+    <p:extLst>
+      <p:ext uri="{BB962C8B-B14F-4D97-AF65-F5344CB8AC3E}">
+        <p14:creationId xmlns:p14="http://schemas.microsoft.com/office/powerpoint/2010/main" val="3062069205"/>
+      </p:ext>
+    </p:extLst>
   </p:cSld>
   <p:clrMapOvr>
     <a:masterClrMapping/>
@@ -1643,6 +1729,11 @@
         </p:txBody>
       </p:sp>
     </p:spTree>
+    <p:extLst>
+      <p:ext uri="{BB962C8B-B14F-4D97-AF65-F5344CB8AC3E}">
+        <p14:creationId xmlns:p14="http://schemas.microsoft.com/office/powerpoint/2010/main" val="2209840233"/>
+      </p:ext>
+    </p:extLst>
   </p:cSld>
   <p:clrMapOvr>
     <a:masterClrMapping/>
@@ -1725,6 +1816,11 @@
         </p:txBody>
       </p:sp>
     </p:spTree>
+    <p:extLst>
+      <p:ext uri="{BB962C8B-B14F-4D97-AF65-F5344CB8AC3E}">
+        <p14:creationId xmlns:p14="http://schemas.microsoft.com/office/powerpoint/2010/main" val="814310215"/>
+      </p:ext>
+    </p:extLst>
   </p:cSld>
   <p:clrMapOvr>
     <a:masterClrMapping/>
@@ -1807,6 +1903,11 @@
         </p:txBody>
       </p:sp>
     </p:spTree>
+    <p:extLst>
+      <p:ext uri="{BB962C8B-B14F-4D97-AF65-F5344CB8AC3E}">
+        <p14:creationId xmlns:p14="http://schemas.microsoft.com/office/powerpoint/2010/main" val="22150309"/>
+      </p:ext>
+    </p:extLst>
   </p:cSld>
   <p:clrMapOvr>
     <a:masterClrMapping/>
@@ -1889,6 +1990,11 @@
         </p:txBody>
       </p:sp>
     </p:spTree>
+    <p:extLst>
+      <p:ext uri="{BB962C8B-B14F-4D97-AF65-F5344CB8AC3E}">
+        <p14:creationId xmlns:p14="http://schemas.microsoft.com/office/powerpoint/2010/main" val="4199047499"/>
+      </p:ext>
+    </p:extLst>
   </p:cSld>
   <p:clrMapOvr>
     <a:masterClrMapping/>
@@ -1971,6 +2077,11 @@
         </p:txBody>
       </p:sp>
     </p:spTree>
+    <p:extLst>
+      <p:ext uri="{BB962C8B-B14F-4D97-AF65-F5344CB8AC3E}">
+        <p14:creationId xmlns:p14="http://schemas.microsoft.com/office/powerpoint/2010/main" val="46042235"/>
+      </p:ext>
+    </p:extLst>
   </p:cSld>
   <p:clrMapOvr>
     <a:masterClrMapping/>
@@ -2053,6 +2164,11 @@
         </p:txBody>
       </p:sp>
     </p:spTree>
+    <p:extLst>
+      <p:ext uri="{BB962C8B-B14F-4D97-AF65-F5344CB8AC3E}">
+        <p14:creationId xmlns:p14="http://schemas.microsoft.com/office/powerpoint/2010/main" val="1432278863"/>
+      </p:ext>
+    </p:extLst>
   </p:cSld>
   <p:clrMapOvr>
     <a:masterClrMapping/>
@@ -2135,6 +2251,11 @@
         </p:txBody>
       </p:sp>
     </p:spTree>
+    <p:extLst>
+      <p:ext uri="{BB962C8B-B14F-4D97-AF65-F5344CB8AC3E}">
+        <p14:creationId xmlns:p14="http://schemas.microsoft.com/office/powerpoint/2010/main" val="2146013628"/>
+      </p:ext>
+    </p:extLst>
   </p:cSld>
   <p:clrMapOvr>
     <a:masterClrMapping/>
@@ -2217,6 +2338,11 @@
         </p:txBody>
       </p:sp>
     </p:spTree>
+    <p:extLst>
+      <p:ext uri="{BB962C8B-B14F-4D97-AF65-F5344CB8AC3E}">
+        <p14:creationId xmlns:p14="http://schemas.microsoft.com/office/powerpoint/2010/main" val="3520095339"/>
+      </p:ext>
+    </p:extLst>
   </p:cSld>
   <p:clrMapOvr>
     <a:masterClrMapping/>
@@ -2299,6 +2425,11 @@
         </p:txBody>
       </p:sp>
     </p:spTree>
+    <p:extLst>
+      <p:ext uri="{BB962C8B-B14F-4D97-AF65-F5344CB8AC3E}">
+        <p14:creationId xmlns:p14="http://schemas.microsoft.com/office/powerpoint/2010/main" val="3998862717"/>
+      </p:ext>
+    </p:extLst>
   </p:cSld>
   <p:clrMapOvr>
     <a:masterClrMapping/>
@@ -2385,6 +2516,11 @@
         </p:txBody>
       </p:sp>
     </p:spTree>
+    <p:extLst>
+      <p:ext uri="{BB962C8B-B14F-4D97-AF65-F5344CB8AC3E}">
+        <p14:creationId xmlns:p14="http://schemas.microsoft.com/office/powerpoint/2010/main" val="2503902526"/>
+      </p:ext>
+    </p:extLst>
   </p:cSld>
   <p:clrMapOvr>
     <a:masterClrMapping/>
@@ -2467,6 +2603,11 @@
         </p:txBody>
       </p:sp>
     </p:spTree>
+    <p:extLst>
+      <p:ext uri="{BB962C8B-B14F-4D97-AF65-F5344CB8AC3E}">
+        <p14:creationId xmlns:p14="http://schemas.microsoft.com/office/powerpoint/2010/main" val="1365825463"/>
+      </p:ext>
+    </p:extLst>
   </p:cSld>
   <p:clrMapOvr>
     <a:masterClrMapping/>
@@ -2549,6 +2690,11 @@
         </p:txBody>
       </p:sp>
     </p:spTree>
+    <p:extLst>
+      <p:ext uri="{BB962C8B-B14F-4D97-AF65-F5344CB8AC3E}">
+        <p14:creationId xmlns:p14="http://schemas.microsoft.com/office/powerpoint/2010/main" val="4127680598"/>
+      </p:ext>
+    </p:extLst>
   </p:cSld>
   <p:clrMapOvr>
     <a:masterClrMapping/>
@@ -2631,6 +2777,11 @@
         </p:txBody>
       </p:sp>
     </p:spTree>
+    <p:extLst>
+      <p:ext uri="{BB962C8B-B14F-4D97-AF65-F5344CB8AC3E}">
+        <p14:creationId xmlns:p14="http://schemas.microsoft.com/office/powerpoint/2010/main" val="899517193"/>
+      </p:ext>
+    </p:extLst>
   </p:cSld>
   <p:clrMapOvr>
     <a:masterClrMapping/>
@@ -2713,6 +2864,11 @@
         </p:txBody>
       </p:sp>
     </p:spTree>
+    <p:extLst>
+      <p:ext uri="{BB962C8B-B14F-4D97-AF65-F5344CB8AC3E}">
+        <p14:creationId xmlns:p14="http://schemas.microsoft.com/office/powerpoint/2010/main" val="565712234"/>
+      </p:ext>
+    </p:extLst>
   </p:cSld>
   <p:clrMapOvr>
     <a:masterClrMapping/>
@@ -2795,6 +2951,11 @@
         </p:txBody>
       </p:sp>
     </p:spTree>
+    <p:extLst>
+      <p:ext uri="{BB962C8B-B14F-4D97-AF65-F5344CB8AC3E}">
+        <p14:creationId xmlns:p14="http://schemas.microsoft.com/office/powerpoint/2010/main" val="1737100544"/>
+      </p:ext>
+    </p:extLst>
   </p:cSld>
   <p:clrMapOvr>
     <a:masterClrMapping/>
@@ -2877,6 +3038,11 @@
         </p:txBody>
       </p:sp>
     </p:spTree>
+    <p:extLst>
+      <p:ext uri="{BB962C8B-B14F-4D97-AF65-F5344CB8AC3E}">
+        <p14:creationId xmlns:p14="http://schemas.microsoft.com/office/powerpoint/2010/main" val="204611756"/>
+      </p:ext>
+    </p:extLst>
   </p:cSld>
   <p:clrMapOvr>
     <a:masterClrMapping/>
@@ -2959,6 +3125,11 @@
         </p:txBody>
       </p:sp>
     </p:spTree>
+    <p:extLst>
+      <p:ext uri="{BB962C8B-B14F-4D97-AF65-F5344CB8AC3E}">
+        <p14:creationId xmlns:p14="http://schemas.microsoft.com/office/powerpoint/2010/main" val="779078344"/>
+      </p:ext>
+    </p:extLst>
   </p:cSld>
   <p:clrMapOvr>
     <a:masterClrMapping/>
@@ -3041,6 +3212,11 @@
         </p:txBody>
       </p:sp>
     </p:spTree>
+    <p:extLst>
+      <p:ext uri="{BB962C8B-B14F-4D97-AF65-F5344CB8AC3E}">
+        <p14:creationId xmlns:p14="http://schemas.microsoft.com/office/powerpoint/2010/main" val="3230366396"/>
+      </p:ext>
+    </p:extLst>
   </p:cSld>
   <p:clrMapOvr>
     <a:masterClrMapping/>
@@ -3123,6 +3299,11 @@
         </p:txBody>
       </p:sp>
     </p:spTree>
+    <p:extLst>
+      <p:ext uri="{BB962C8B-B14F-4D97-AF65-F5344CB8AC3E}">
+        <p14:creationId xmlns:p14="http://schemas.microsoft.com/office/powerpoint/2010/main" val="2129835185"/>
+      </p:ext>
+    </p:extLst>
   </p:cSld>
   <p:clrMapOvr>
     <a:masterClrMapping/>
@@ -3205,6 +3386,11 @@
         </p:txBody>
       </p:sp>
     </p:spTree>
+    <p:extLst>
+      <p:ext uri="{BB962C8B-B14F-4D97-AF65-F5344CB8AC3E}">
+        <p14:creationId xmlns:p14="http://schemas.microsoft.com/office/powerpoint/2010/main" val="962578081"/>
+      </p:ext>
+    </p:extLst>
   </p:cSld>
   <p:clrMapOvr>
     <a:masterClrMapping/>
@@ -3287,6 +3473,11 @@
         </p:txBody>
       </p:sp>
     </p:spTree>
+    <p:extLst>
+      <p:ext uri="{BB962C8B-B14F-4D97-AF65-F5344CB8AC3E}">
+        <p14:creationId xmlns:p14="http://schemas.microsoft.com/office/powerpoint/2010/main" val="3753862178"/>
+      </p:ext>
+    </p:extLst>
   </p:cSld>
   <p:clrMapOvr>
     <a:masterClrMapping/>
@@ -3374,6 +3565,11 @@
         </p:txBody>
       </p:sp>
     </p:spTree>
+    <p:extLst>
+      <p:ext uri="{BB962C8B-B14F-4D97-AF65-F5344CB8AC3E}">
+        <p14:creationId xmlns:p14="http://schemas.microsoft.com/office/powerpoint/2010/main" val="704979288"/>
+      </p:ext>
+    </p:extLst>
   </p:cSld>
   <p:clrMapOvr>
     <a:masterClrMapping/>
@@ -3461,6 +3657,11 @@
         </p:txBody>
       </p:sp>
     </p:spTree>
+    <p:extLst>
+      <p:ext uri="{BB962C8B-B14F-4D97-AF65-F5344CB8AC3E}">
+        <p14:creationId xmlns:p14="http://schemas.microsoft.com/office/powerpoint/2010/main" val="4125142584"/>
+      </p:ext>
+    </p:extLst>
   </p:cSld>
   <p:clrMapOvr>
     <a:masterClrMapping/>
@@ -3548,6 +3749,11 @@
         </p:txBody>
       </p:sp>
     </p:spTree>
+    <p:extLst>
+      <p:ext uri="{BB962C8B-B14F-4D97-AF65-F5344CB8AC3E}">
+        <p14:creationId xmlns:p14="http://schemas.microsoft.com/office/powerpoint/2010/main" val="3084740851"/>
+      </p:ext>
+    </p:extLst>
   </p:cSld>
   <p:clrMapOvr>
     <a:masterClrMapping/>
@@ -3630,6 +3836,11 @@
         </p:txBody>
       </p:sp>
     </p:spTree>
+    <p:extLst>
+      <p:ext uri="{BB962C8B-B14F-4D97-AF65-F5344CB8AC3E}">
+        <p14:creationId xmlns:p14="http://schemas.microsoft.com/office/powerpoint/2010/main" val="4236094475"/>
+      </p:ext>
+    </p:extLst>
   </p:cSld>
   <p:clrMapOvr>
     <a:masterClrMapping/>
@@ -3712,6 +3923,11 @@
         </p:txBody>
       </p:sp>
     </p:spTree>
+    <p:extLst>
+      <p:ext uri="{BB962C8B-B14F-4D97-AF65-F5344CB8AC3E}">
+        <p14:creationId xmlns:p14="http://schemas.microsoft.com/office/powerpoint/2010/main" val="2908607167"/>
+      </p:ext>
+    </p:extLst>
   </p:cSld>
   <p:clrMapOvr>
     <a:masterClrMapping/>
@@ -3794,6 +4010,11 @@
         </p:txBody>
       </p:sp>
     </p:spTree>
+    <p:extLst>
+      <p:ext uri="{BB962C8B-B14F-4D97-AF65-F5344CB8AC3E}">
+        <p14:creationId xmlns:p14="http://schemas.microsoft.com/office/powerpoint/2010/main" val="2846057766"/>
+      </p:ext>
+    </p:extLst>
   </p:cSld>
   <p:clrMapOvr>
     <a:masterClrMapping/>
@@ -3876,6 +4097,11 @@
         </p:txBody>
       </p:sp>
     </p:spTree>
+    <p:extLst>
+      <p:ext uri="{BB962C8B-B14F-4D97-AF65-F5344CB8AC3E}">
+        <p14:creationId xmlns:p14="http://schemas.microsoft.com/office/powerpoint/2010/main" val="784158285"/>
+      </p:ext>
+    </p:extLst>
   </p:cSld>
   <p:clrMapOvr>
     <a:masterClrMapping/>
@@ -3958,6 +4184,11 @@
         </p:txBody>
       </p:sp>
     </p:spTree>
+    <p:extLst>
+      <p:ext uri="{BB962C8B-B14F-4D97-AF65-F5344CB8AC3E}">
+        <p14:creationId xmlns:p14="http://schemas.microsoft.com/office/powerpoint/2010/main" val="1224394530"/>
+      </p:ext>
+    </p:extLst>
   </p:cSld>
   <p:clrMapOvr>
     <a:masterClrMapping/>
@@ -4040,6 +4271,11 @@
         </p:txBody>
       </p:sp>
     </p:spTree>
+    <p:extLst>
+      <p:ext uri="{BB962C8B-B14F-4D97-AF65-F5344CB8AC3E}">
+        <p14:creationId xmlns:p14="http://schemas.microsoft.com/office/powerpoint/2010/main" val="1142635053"/>
+      </p:ext>
+    </p:extLst>
   </p:cSld>
   <p:clrMapOvr>
     <a:masterClrMapping/>
@@ -4229,7 +4465,7 @@
             <a:fld id="{1D8BD707-D9CF-40AE-B4C6-C98DA3205C09}" type="datetimeFigureOut">
               <a:rPr lang="en-US" smtClean="0"/>
               <a:pPr/>
-              <a:t>1/26/2016</a:t>
+              <a:t>2/2/2016</a:t>
             </a:fld>
             <a:endParaRPr lang="en-US"/>
           </a:p>
@@ -4396,7 +4632,7 @@
             <a:fld id="{1D8BD707-D9CF-40AE-B4C6-C98DA3205C09}" type="datetimeFigureOut">
               <a:rPr lang="en-US" smtClean="0"/>
               <a:pPr/>
-              <a:t>1/26/2016</a:t>
+              <a:t>2/2/2016</a:t>
             </a:fld>
             <a:endParaRPr lang="en-US"/>
           </a:p>
@@ -4573,7 +4809,7 @@
             <a:fld id="{1D8BD707-D9CF-40AE-B4C6-C98DA3205C09}" type="datetimeFigureOut">
               <a:rPr lang="en-US" smtClean="0"/>
               <a:pPr/>
-              <a:t>1/26/2016</a:t>
+              <a:t>2/2/2016</a:t>
             </a:fld>
             <a:endParaRPr lang="en-US"/>
           </a:p>
@@ -4740,7 +4976,7 @@
             <a:fld id="{1D8BD707-D9CF-40AE-B4C6-C98DA3205C09}" type="datetimeFigureOut">
               <a:rPr lang="en-US" smtClean="0"/>
               <a:pPr/>
-              <a:t>1/26/2016</a:t>
+              <a:t>2/2/2016</a:t>
             </a:fld>
             <a:endParaRPr lang="en-US"/>
           </a:p>
@@ -4983,7 +5219,7 @@
             <a:fld id="{1D8BD707-D9CF-40AE-B4C6-C98DA3205C09}" type="datetimeFigureOut">
               <a:rPr lang="en-US" smtClean="0"/>
               <a:pPr/>
-              <a:t>1/26/2016</a:t>
+              <a:t>2/2/2016</a:t>
             </a:fld>
             <a:endParaRPr lang="en-US"/>
           </a:p>
@@ -5268,7 +5504,7 @@
             <a:fld id="{1D8BD707-D9CF-40AE-B4C6-C98DA3205C09}" type="datetimeFigureOut">
               <a:rPr lang="en-US" smtClean="0"/>
               <a:pPr/>
-              <a:t>1/26/2016</a:t>
+              <a:t>2/2/2016</a:t>
             </a:fld>
             <a:endParaRPr lang="en-US"/>
           </a:p>
@@ -5687,7 +5923,7 @@
             <a:fld id="{1D8BD707-D9CF-40AE-B4C6-C98DA3205C09}" type="datetimeFigureOut">
               <a:rPr lang="en-US" smtClean="0"/>
               <a:pPr/>
-              <a:t>1/26/2016</a:t>
+              <a:t>2/2/2016</a:t>
             </a:fld>
             <a:endParaRPr lang="en-US"/>
           </a:p>
@@ -5802,7 +6038,7 @@
             <a:fld id="{1D8BD707-D9CF-40AE-B4C6-C98DA3205C09}" type="datetimeFigureOut">
               <a:rPr lang="en-US" smtClean="0"/>
               <a:pPr/>
-              <a:t>1/26/2016</a:t>
+              <a:t>2/2/2016</a:t>
             </a:fld>
             <a:endParaRPr lang="en-US"/>
           </a:p>
@@ -5894,7 +6130,7 @@
             <a:fld id="{1D8BD707-D9CF-40AE-B4C6-C98DA3205C09}" type="datetimeFigureOut">
               <a:rPr lang="en-US" smtClean="0"/>
               <a:pPr/>
-              <a:t>1/26/2016</a:t>
+              <a:t>2/2/2016</a:t>
             </a:fld>
             <a:endParaRPr lang="en-US"/>
           </a:p>
@@ -6168,7 +6404,7 @@
             <a:fld id="{1D8BD707-D9CF-40AE-B4C6-C98DA3205C09}" type="datetimeFigureOut">
               <a:rPr lang="en-US" smtClean="0"/>
               <a:pPr/>
-              <a:t>1/26/2016</a:t>
+              <a:t>2/2/2016</a:t>
             </a:fld>
             <a:endParaRPr lang="en-US"/>
           </a:p>
@@ -6418,7 +6654,7 @@
             <a:fld id="{1D8BD707-D9CF-40AE-B4C6-C98DA3205C09}" type="datetimeFigureOut">
               <a:rPr lang="en-US" smtClean="0"/>
               <a:pPr/>
-              <a:t>1/26/2016</a:t>
+              <a:t>2/2/2016</a:t>
             </a:fld>
             <a:endParaRPr lang="en-US"/>
           </a:p>
@@ -6628,7 +6864,7 @@
             <a:fld id="{1D8BD707-D9CF-40AE-B4C6-C98DA3205C09}" type="datetimeFigureOut">
               <a:rPr lang="en-US" smtClean="0"/>
               <a:pPr/>
-              <a:t>1/26/2016</a:t>
+              <a:t>2/2/2016</a:t>
             </a:fld>
             <a:endParaRPr lang="en-US"/>
           </a:p>
@@ -11078,9 +11314,59 @@
         </p:xfrm>
         <a:graphic>
           <a:graphicData uri="http://schemas.openxmlformats.org/presentationml/2006/ole">
-            <p:oleObj spid="_x0000_s1026" name="Equation" r:id="rId4" imgW="1257120" imgH="330120" progId="Equation.3">
-              <p:embed/>
-            </p:oleObj>
+            <mc:AlternateContent xmlns:mc="http://schemas.openxmlformats.org/markup-compatibility/2006">
+              <mc:Choice xmlns:v="urn:schemas-microsoft-com:vml" Requires="v">
+                <p:oleObj spid="_x0000_s1028" name="Equation" r:id="rId4" imgW="1257120" imgH="330120" progId="Equation.3">
+                  <p:embed/>
+                </p:oleObj>
+              </mc:Choice>
+              <mc:Fallback>
+                <p:oleObj name="Equation" r:id="rId4" imgW="1257120" imgH="330120" progId="Equation.3">
+                  <p:embed/>
+                  <p:pic>
+                    <p:nvPicPr>
+                      <p:cNvPr id="0" name="Picture 2"/>
+                      <p:cNvPicPr>
+                        <a:picLocks noChangeAspect="1" noChangeArrowheads="1"/>
+                      </p:cNvPicPr>
+                      <p:nvPr/>
+                    </p:nvPicPr>
+                    <p:blipFill>
+                      <a:blip r:embed="rId5">
+                        <a:extLst>
+                          <a:ext uri="{28A0092B-C50C-407E-A947-70E740481C1C}">
+                            <a14:useLocalDpi xmlns:a14="http://schemas.microsoft.com/office/drawing/2010/main" val="0"/>
+                          </a:ext>
+                        </a:extLst>
+                      </a:blip>
+                      <a:srcRect/>
+                      <a:stretch>
+                        <a:fillRect/>
+                      </a:stretch>
+                    </p:blipFill>
+                    <p:spPr bwMode="auto">
+                      <a:xfrm>
+                        <a:off x="2771775" y="5486400"/>
+                        <a:ext cx="1743075" cy="457200"/>
+                      </a:xfrm>
+                      <a:prstGeom prst="rect">
+                        <a:avLst/>
+                      </a:prstGeom>
+                      <a:noFill/>
+                      <a:extLst>
+                        <a:ext uri="{909E8E84-426E-40DD-AFC4-6F175D3DCCD1}">
+                          <a14:hiddenFill xmlns:a14="http://schemas.microsoft.com/office/drawing/2010/main">
+                            <a:solidFill>
+                              <a:srgbClr val="FFFFFF"/>
+                            </a:solidFill>
+                          </a14:hiddenFill>
+                        </a:ext>
+                      </a:extLst>
+                    </p:spPr>
+                  </p:pic>
+                </p:oleObj>
+              </mc:Fallback>
+            </mc:AlternateContent>
           </a:graphicData>
         </a:graphic>
       </p:graphicFrame>
@@ -11221,9 +11507,59 @@
         </p:xfrm>
         <a:graphic>
           <a:graphicData uri="http://schemas.openxmlformats.org/presentationml/2006/ole">
-            <p:oleObj spid="_x0000_s2050" name="Equation" r:id="rId4" imgW="1257120" imgH="330120" progId="Equation.3">
-              <p:embed/>
-            </p:oleObj>
+            <mc:AlternateContent xmlns:mc="http://schemas.openxmlformats.org/markup-compatibility/2006">
+              <mc:Choice xmlns:v="urn:schemas-microsoft-com:vml" Requires="v">
+                <p:oleObj spid="_x0000_s2056" name="Equation" r:id="rId4" imgW="1257120" imgH="330120" progId="Equation.3">
+                  <p:embed/>
+                </p:oleObj>
+              </mc:Choice>
+              <mc:Fallback>
+                <p:oleObj name="Equation" r:id="rId4" imgW="1257120" imgH="330120" progId="Equation.3">
+                  <p:embed/>
+                  <p:pic>
+                    <p:nvPicPr>
+                      <p:cNvPr id="0" name="Picture 2"/>
+                      <p:cNvPicPr>
+                        <a:picLocks noChangeAspect="1" noChangeArrowheads="1"/>
+                      </p:cNvPicPr>
+                      <p:nvPr/>
+                    </p:nvPicPr>
+                    <p:blipFill>
+                      <a:blip r:embed="rId5">
+                        <a:extLst>
+                          <a:ext uri="{28A0092B-C50C-407E-A947-70E740481C1C}">
+                            <a14:useLocalDpi xmlns:a14="http://schemas.microsoft.com/office/drawing/2010/main" val="0"/>
+                          </a:ext>
+                        </a:extLst>
+                      </a:blip>
+                      <a:srcRect/>
+                      <a:stretch>
+                        <a:fillRect/>
+                      </a:stretch>
+                    </p:blipFill>
+                    <p:spPr bwMode="auto">
+                      <a:xfrm>
+                        <a:off x="2590800" y="895529"/>
+                        <a:ext cx="1743075" cy="457200"/>
+                      </a:xfrm>
+                      <a:prstGeom prst="rect">
+                        <a:avLst/>
+                      </a:prstGeom>
+                      <a:noFill/>
+                      <a:extLst>
+                        <a:ext uri="{909E8E84-426E-40DD-AFC4-6F175D3DCCD1}">
+                          <a14:hiddenFill xmlns:a14="http://schemas.microsoft.com/office/drawing/2010/main">
+                            <a:solidFill>
+                              <a:srgbClr val="FFFFFF"/>
+                            </a:solidFill>
+                          </a14:hiddenFill>
+                        </a:ext>
+                      </a:extLst>
+                    </p:spPr>
+                  </p:pic>
+                </p:oleObj>
+              </mc:Fallback>
+            </mc:AlternateContent>
           </a:graphicData>
         </a:graphic>
       </p:graphicFrame>
@@ -11302,38 +11638,6 @@
       <p:pic>
         <p:nvPicPr>
           <p:cNvPr id="2051" name="Picture 3"/>
-          <p:cNvPicPr>
-            <a:picLocks noChangeAspect="1" noChangeArrowheads="1"/>
-          </p:cNvPicPr>
-          <p:nvPr/>
-        </p:nvPicPr>
-        <p:blipFill>
-          <a:blip r:embed="rId5" cstate="print"/>
-          <a:srcRect/>
-          <a:stretch>
-            <a:fillRect/>
-          </a:stretch>
-        </p:blipFill>
-        <p:spPr bwMode="auto">
-          <a:xfrm>
-            <a:off x="5181600" y="3352800"/>
-            <a:ext cx="3276600" cy="3255960"/>
-          </a:xfrm>
-          <a:prstGeom prst="rect">
-            <a:avLst/>
-          </a:prstGeom>
-          <a:noFill/>
-          <a:ln w="9525">
-            <a:noFill/>
-            <a:miter lim="800000"/>
-            <a:headEnd/>
-            <a:tailEnd/>
-          </a:ln>
-        </p:spPr>
-      </p:pic>
-      <p:pic>
-        <p:nvPicPr>
-          <p:cNvPr id="2052" name="Picture 4"/>
           <p:cNvPicPr>
             <a:picLocks noChangeAspect="1" noChangeArrowheads="1"/>
           </p:cNvPicPr>
@@ -11348,8 +11652,8 @@
         </p:blipFill>
         <p:spPr bwMode="auto">
           <a:xfrm>
-            <a:off x="1828800" y="3276600"/>
-            <a:ext cx="3108798" cy="990600"/>
+            <a:off x="5181600" y="3352800"/>
+            <a:ext cx="3276600" cy="3255960"/>
           </a:xfrm>
           <a:prstGeom prst="rect">
             <a:avLst/>
@@ -11365,7 +11669,7 @@
       </p:pic>
       <p:pic>
         <p:nvPicPr>
-          <p:cNvPr id="13" name="Picture 2"/>
+          <p:cNvPr id="2052" name="Picture 4"/>
           <p:cNvPicPr>
             <a:picLocks noChangeAspect="1" noChangeArrowheads="1"/>
           </p:cNvPicPr>
@@ -11380,8 +11684,8 @@
         </p:blipFill>
         <p:spPr bwMode="auto">
           <a:xfrm>
-            <a:off x="381000" y="3962400"/>
-            <a:ext cx="4800600" cy="2236209"/>
+            <a:off x="1828800" y="3276600"/>
+            <a:ext cx="3108798" cy="990600"/>
           </a:xfrm>
           <a:prstGeom prst="rect">
             <a:avLst/>
@@ -11395,6 +11699,38 @@
           </a:ln>
         </p:spPr>
       </p:pic>
+      <p:pic>
+        <p:nvPicPr>
+          <p:cNvPr id="13" name="Picture 2"/>
+          <p:cNvPicPr>
+            <a:picLocks noChangeAspect="1" noChangeArrowheads="1"/>
+          </p:cNvPicPr>
+          <p:nvPr/>
+        </p:nvPicPr>
+        <p:blipFill>
+          <a:blip r:embed="rId8" cstate="print"/>
+          <a:srcRect/>
+          <a:stretch>
+            <a:fillRect/>
+          </a:stretch>
+        </p:blipFill>
+        <p:spPr bwMode="auto">
+          <a:xfrm>
+            <a:off x="381000" y="3962400"/>
+            <a:ext cx="4800600" cy="2236209"/>
+          </a:xfrm>
+          <a:prstGeom prst="rect">
+            <a:avLst/>
+          </a:prstGeom>
+          <a:noFill/>
+          <a:ln w="9525">
+            <a:noFill/>
+            <a:miter lim="800000"/>
+            <a:headEnd/>
+            <a:tailEnd/>
+          </a:ln>
+        </p:spPr>
+      </p:pic>
       <p:graphicFrame>
         <p:nvGraphicFramePr>
           <p:cNvPr id="14" name="Object 13"/>
@@ -11409,9 +11745,59 @@
         </p:xfrm>
         <a:graphic>
           <a:graphicData uri="http://schemas.openxmlformats.org/presentationml/2006/ole">
-            <p:oleObj spid="_x0000_s2053" name="Equation" r:id="rId8" imgW="927000" imgH="393480" progId="Equation.3">
-              <p:embed/>
-            </p:oleObj>
+            <mc:AlternateContent xmlns:mc="http://schemas.openxmlformats.org/markup-compatibility/2006">
+              <mc:Choice xmlns:v="urn:schemas-microsoft-com:vml" Requires="v">
+                <p:oleObj spid="_x0000_s2057" name="Equation" r:id="rId9" imgW="927000" imgH="393480" progId="Equation.3">
+                  <p:embed/>
+                </p:oleObj>
+              </mc:Choice>
+              <mc:Fallback>
+                <p:oleObj name="Equation" r:id="rId9" imgW="927000" imgH="393480" progId="Equation.3">
+                  <p:embed/>
+                  <p:pic>
+                    <p:nvPicPr>
+                      <p:cNvPr id="0" name="Picture 5"/>
+                      <p:cNvPicPr>
+                        <a:picLocks noChangeAspect="1" noChangeArrowheads="1"/>
+                      </p:cNvPicPr>
+                      <p:nvPr/>
+                    </p:nvPicPr>
+                    <p:blipFill>
+                      <a:blip r:embed="rId10">
+                        <a:extLst>
+                          <a:ext uri="{28A0092B-C50C-407E-A947-70E740481C1C}">
+                            <a14:useLocalDpi xmlns:a14="http://schemas.microsoft.com/office/drawing/2010/main" val="0"/>
+                          </a:ext>
+                        </a:extLst>
+                      </a:blip>
+                      <a:srcRect/>
+                      <a:stretch>
+                        <a:fillRect/>
+                      </a:stretch>
+                    </p:blipFill>
+                    <p:spPr bwMode="auto">
+                      <a:xfrm>
+                        <a:off x="3048000" y="6019800"/>
+                        <a:ext cx="1614948" cy="685800"/>
+                      </a:xfrm>
+                      <a:prstGeom prst="rect">
+                        <a:avLst/>
+                      </a:prstGeom>
+                      <a:noFill/>
+                      <a:extLst>
+                        <a:ext uri="{909E8E84-426E-40DD-AFC4-6F175D3DCCD1}">
+                          <a14:hiddenFill xmlns:a14="http://schemas.microsoft.com/office/drawing/2010/main">
+                            <a:solidFill>
+                              <a:srgbClr val="FFFFFF"/>
+                            </a:solidFill>
+                          </a14:hiddenFill>
+                        </a:ext>
+                      </a:extLst>
+                    </p:spPr>
+                  </p:pic>
+                </p:oleObj>
+              </mc:Fallback>
+            </mc:AlternateContent>
           </a:graphicData>
         </a:graphic>
       </p:graphicFrame>
@@ -11582,9 +11968,59 @@
         </p:xfrm>
         <a:graphic>
           <a:graphicData uri="http://schemas.openxmlformats.org/presentationml/2006/ole">
-            <p:oleObj spid="_x0000_s4098" name="Equation" r:id="rId4" imgW="1257120" imgH="330120" progId="Equation.3">
-              <p:embed/>
-            </p:oleObj>
+            <mc:AlternateContent xmlns:mc="http://schemas.openxmlformats.org/markup-compatibility/2006">
+              <mc:Choice xmlns:v="urn:schemas-microsoft-com:vml" Requires="v">
+                <p:oleObj spid="_x0000_s4118" name="Equation" r:id="rId4" imgW="1257120" imgH="330120" progId="Equation.3">
+                  <p:embed/>
+                </p:oleObj>
+              </mc:Choice>
+              <mc:Fallback>
+                <p:oleObj name="Equation" r:id="rId4" imgW="1257120" imgH="330120" progId="Equation.3">
+                  <p:embed/>
+                  <p:pic>
+                    <p:nvPicPr>
+                      <p:cNvPr id="0" name="Picture 2"/>
+                      <p:cNvPicPr>
+                        <a:picLocks noChangeAspect="1" noChangeArrowheads="1"/>
+                      </p:cNvPicPr>
+                      <p:nvPr/>
+                    </p:nvPicPr>
+                    <p:blipFill>
+                      <a:blip r:embed="rId5">
+                        <a:extLst>
+                          <a:ext uri="{28A0092B-C50C-407E-A947-70E740481C1C}">
+                            <a14:useLocalDpi xmlns:a14="http://schemas.microsoft.com/office/drawing/2010/main" val="0"/>
+                          </a:ext>
+                        </a:extLst>
+                      </a:blip>
+                      <a:srcRect/>
+                      <a:stretch>
+                        <a:fillRect/>
+                      </a:stretch>
+                    </p:blipFill>
+                    <p:spPr bwMode="auto">
+                      <a:xfrm>
+                        <a:off x="2590800" y="895529"/>
+                        <a:ext cx="1743075" cy="457200"/>
+                      </a:xfrm>
+                      <a:prstGeom prst="rect">
+                        <a:avLst/>
+                      </a:prstGeom>
+                      <a:noFill/>
+                      <a:extLst>
+                        <a:ext uri="{909E8E84-426E-40DD-AFC4-6F175D3DCCD1}">
+                          <a14:hiddenFill xmlns:a14="http://schemas.microsoft.com/office/drawing/2010/main">
+                            <a:solidFill>
+                              <a:srgbClr val="FFFFFF"/>
+                            </a:solidFill>
+                          </a14:hiddenFill>
+                        </a:ext>
+                      </a:extLst>
+                    </p:spPr>
+                  </p:pic>
+                </p:oleObj>
+              </mc:Fallback>
+            </mc:AlternateContent>
           </a:graphicData>
         </a:graphic>
       </p:graphicFrame>
@@ -11602,9 +12038,59 @@
         </p:xfrm>
         <a:graphic>
           <a:graphicData uri="http://schemas.openxmlformats.org/presentationml/2006/ole">
-            <p:oleObj spid="_x0000_s4099" name="Equation" r:id="rId5" imgW="2171520" imgH="431640" progId="Equation.3">
-              <p:embed/>
-            </p:oleObj>
+            <mc:AlternateContent xmlns:mc="http://schemas.openxmlformats.org/markup-compatibility/2006">
+              <mc:Choice xmlns:v="urn:schemas-microsoft-com:vml" Requires="v">
+                <p:oleObj spid="_x0000_s4119" name="Equation" r:id="rId6" imgW="2171520" imgH="431640" progId="Equation.3">
+                  <p:embed/>
+                </p:oleObj>
+              </mc:Choice>
+              <mc:Fallback>
+                <p:oleObj name="Equation" r:id="rId6" imgW="2171520" imgH="431640" progId="Equation.3">
+                  <p:embed/>
+                  <p:pic>
+                    <p:nvPicPr>
+                      <p:cNvPr id="0" name="Picture 3"/>
+                      <p:cNvPicPr>
+                        <a:picLocks noChangeAspect="1" noChangeArrowheads="1"/>
+                      </p:cNvPicPr>
+                      <p:nvPr/>
+                    </p:nvPicPr>
+                    <p:blipFill>
+                      <a:blip r:embed="rId7">
+                        <a:extLst>
+                          <a:ext uri="{28A0092B-C50C-407E-A947-70E740481C1C}">
+                            <a14:useLocalDpi xmlns:a14="http://schemas.microsoft.com/office/drawing/2010/main" val="0"/>
+                          </a:ext>
+                        </a:extLst>
+                      </a:blip>
+                      <a:srcRect/>
+                      <a:stretch>
+                        <a:fillRect/>
+                      </a:stretch>
+                    </p:blipFill>
+                    <p:spPr bwMode="auto">
+                      <a:xfrm>
+                        <a:off x="2774950" y="2493963"/>
+                        <a:ext cx="3778250" cy="750887"/>
+                      </a:xfrm>
+                      <a:prstGeom prst="rect">
+                        <a:avLst/>
+                      </a:prstGeom>
+                      <a:noFill/>
+                      <a:extLst>
+                        <a:ext uri="{909E8E84-426E-40DD-AFC4-6F175D3DCCD1}">
+                          <a14:hiddenFill xmlns:a14="http://schemas.microsoft.com/office/drawing/2010/main">
+                            <a:solidFill>
+                              <a:srgbClr val="FFFFFF"/>
+                            </a:solidFill>
+                          </a14:hiddenFill>
+                        </a:ext>
+                      </a:extLst>
+                    </p:spPr>
+                  </p:pic>
+                </p:oleObj>
+              </mc:Fallback>
+            </mc:AlternateContent>
           </a:graphicData>
         </a:graphic>
       </p:graphicFrame>
@@ -11713,9 +12199,59 @@
         </p:xfrm>
         <a:graphic>
           <a:graphicData uri="http://schemas.openxmlformats.org/presentationml/2006/ole">
-            <p:oleObj spid="_x0000_s4100" name="Equation" r:id="rId6" imgW="1460160" imgH="253800" progId="Equation.3">
-              <p:embed/>
-            </p:oleObj>
+            <mc:AlternateContent xmlns:mc="http://schemas.openxmlformats.org/markup-compatibility/2006">
+              <mc:Choice xmlns:v="urn:schemas-microsoft-com:vml" Requires="v">
+                <p:oleObj spid="_x0000_s4120" name="Equation" r:id="rId8" imgW="1460160" imgH="253800" progId="Equation.3">
+                  <p:embed/>
+                </p:oleObj>
+              </mc:Choice>
+              <mc:Fallback>
+                <p:oleObj name="Equation" r:id="rId8" imgW="1460160" imgH="253800" progId="Equation.3">
+                  <p:embed/>
+                  <p:pic>
+                    <p:nvPicPr>
+                      <p:cNvPr id="0" name="Picture 4"/>
+                      <p:cNvPicPr>
+                        <a:picLocks noChangeAspect="1" noChangeArrowheads="1"/>
+                      </p:cNvPicPr>
+                      <p:nvPr/>
+                    </p:nvPicPr>
+                    <p:blipFill>
+                      <a:blip r:embed="rId9">
+                        <a:extLst>
+                          <a:ext uri="{28A0092B-C50C-407E-A947-70E740481C1C}">
+                            <a14:useLocalDpi xmlns:a14="http://schemas.microsoft.com/office/drawing/2010/main" val="0"/>
+                          </a:ext>
+                        </a:extLst>
+                      </a:blip>
+                      <a:srcRect/>
+                      <a:stretch>
+                        <a:fillRect/>
+                      </a:stretch>
+                    </p:blipFill>
+                    <p:spPr bwMode="auto">
+                      <a:xfrm>
+                        <a:off x="2314575" y="3309938"/>
+                        <a:ext cx="3305175" cy="576262"/>
+                      </a:xfrm>
+                      <a:prstGeom prst="rect">
+                        <a:avLst/>
+                      </a:prstGeom>
+                      <a:noFill/>
+                      <a:extLst>
+                        <a:ext uri="{909E8E84-426E-40DD-AFC4-6F175D3DCCD1}">
+                          <a14:hiddenFill xmlns:a14="http://schemas.microsoft.com/office/drawing/2010/main">
+                            <a:solidFill>
+                              <a:srgbClr val="FFFFFF"/>
+                            </a:solidFill>
+                          </a14:hiddenFill>
+                        </a:ext>
+                      </a:extLst>
+                    </p:spPr>
+                  </p:pic>
+                </p:oleObj>
+              </mc:Fallback>
+            </mc:AlternateContent>
           </a:graphicData>
         </a:graphic>
       </p:graphicFrame>
@@ -11888,9 +12424,59 @@
         </p:xfrm>
         <a:graphic>
           <a:graphicData uri="http://schemas.openxmlformats.org/presentationml/2006/ole">
-            <p:oleObj spid="_x0000_s4103" name="Equation" r:id="rId7" imgW="1638000" imgH="228600" progId="Equation.3">
-              <p:embed/>
-            </p:oleObj>
+            <mc:AlternateContent xmlns:mc="http://schemas.openxmlformats.org/markup-compatibility/2006">
+              <mc:Choice xmlns:v="urn:schemas-microsoft-com:vml" Requires="v">
+                <p:oleObj spid="_x0000_s4121" name="Equation" r:id="rId10" imgW="1638000" imgH="228600" progId="Equation.3">
+                  <p:embed/>
+                </p:oleObj>
+              </mc:Choice>
+              <mc:Fallback>
+                <p:oleObj name="Equation" r:id="rId10" imgW="1638000" imgH="228600" progId="Equation.3">
+                  <p:embed/>
+                  <p:pic>
+                    <p:nvPicPr>
+                      <p:cNvPr id="0" name="Picture 7"/>
+                      <p:cNvPicPr>
+                        <a:picLocks noChangeAspect="1" noChangeArrowheads="1"/>
+                      </p:cNvPicPr>
+                      <p:nvPr/>
+                    </p:nvPicPr>
+                    <p:blipFill>
+                      <a:blip r:embed="rId11">
+                        <a:extLst>
+                          <a:ext uri="{28A0092B-C50C-407E-A947-70E740481C1C}">
+                            <a14:useLocalDpi xmlns:a14="http://schemas.microsoft.com/office/drawing/2010/main" val="0"/>
+                          </a:ext>
+                        </a:extLst>
+                      </a:blip>
+                      <a:srcRect/>
+                      <a:stretch>
+                        <a:fillRect/>
+                      </a:stretch>
+                    </p:blipFill>
+                    <p:spPr bwMode="auto">
+                      <a:xfrm>
+                        <a:off x="2667000" y="4191000"/>
+                        <a:ext cx="3276600" cy="457200"/>
+                      </a:xfrm>
+                      <a:prstGeom prst="rect">
+                        <a:avLst/>
+                      </a:prstGeom>
+                      <a:noFill/>
+                      <a:extLst>
+                        <a:ext uri="{909E8E84-426E-40DD-AFC4-6F175D3DCCD1}">
+                          <a14:hiddenFill xmlns:a14="http://schemas.microsoft.com/office/drawing/2010/main">
+                            <a:solidFill>
+                              <a:srgbClr val="FFFFFF"/>
+                            </a:solidFill>
+                          </a14:hiddenFill>
+                        </a:ext>
+                      </a:extLst>
+                    </p:spPr>
+                  </p:pic>
+                </p:oleObj>
+              </mc:Fallback>
+            </mc:AlternateContent>
           </a:graphicData>
         </a:graphic>
       </p:graphicFrame>
@@ -11908,9 +12494,59 @@
         </p:xfrm>
         <a:graphic>
           <a:graphicData uri="http://schemas.openxmlformats.org/presentationml/2006/ole">
-            <p:oleObj spid="_x0000_s4105" name="Equation" r:id="rId8" imgW="2336760" imgH="431640" progId="Equation.3">
-              <p:embed/>
-            </p:oleObj>
+            <mc:AlternateContent xmlns:mc="http://schemas.openxmlformats.org/markup-compatibility/2006">
+              <mc:Choice xmlns:v="urn:schemas-microsoft-com:vml" Requires="v">
+                <p:oleObj spid="_x0000_s4122" name="Equation" r:id="rId12" imgW="2336760" imgH="431640" progId="Equation.3">
+                  <p:embed/>
+                </p:oleObj>
+              </mc:Choice>
+              <mc:Fallback>
+                <p:oleObj name="Equation" r:id="rId12" imgW="2336760" imgH="431640" progId="Equation.3">
+                  <p:embed/>
+                  <p:pic>
+                    <p:nvPicPr>
+                      <p:cNvPr id="0" name="Picture 9"/>
+                      <p:cNvPicPr>
+                        <a:picLocks noChangeAspect="1" noChangeArrowheads="1"/>
+                      </p:cNvPicPr>
+                      <p:nvPr/>
+                    </p:nvPicPr>
+                    <p:blipFill>
+                      <a:blip r:embed="rId13">
+                        <a:extLst>
+                          <a:ext uri="{28A0092B-C50C-407E-A947-70E740481C1C}">
+                            <a14:useLocalDpi xmlns:a14="http://schemas.microsoft.com/office/drawing/2010/main" val="0"/>
+                          </a:ext>
+                        </a:extLst>
+                      </a:blip>
+                      <a:srcRect/>
+                      <a:stretch>
+                        <a:fillRect/>
+                      </a:stretch>
+                    </p:blipFill>
+                    <p:spPr bwMode="auto">
+                      <a:xfrm>
+                        <a:off x="1752600" y="4648200"/>
+                        <a:ext cx="4222750" cy="780469"/>
+                      </a:xfrm>
+                      <a:prstGeom prst="rect">
+                        <a:avLst/>
+                      </a:prstGeom>
+                      <a:noFill/>
+                      <a:extLst>
+                        <a:ext uri="{909E8E84-426E-40DD-AFC4-6F175D3DCCD1}">
+                          <a14:hiddenFill xmlns:a14="http://schemas.microsoft.com/office/drawing/2010/main">
+                            <a:solidFill>
+                              <a:srgbClr val="FFFFFF"/>
+                            </a:solidFill>
+                          </a14:hiddenFill>
+                        </a:ext>
+                      </a:extLst>
+                    </p:spPr>
+                  </p:pic>
+                </p:oleObj>
+              </mc:Fallback>
+            </mc:AlternateContent>
           </a:graphicData>
         </a:graphic>
       </p:graphicFrame>
@@ -11928,9 +12564,59 @@
         </p:xfrm>
         <a:graphic>
           <a:graphicData uri="http://schemas.openxmlformats.org/presentationml/2006/ole">
-            <p:oleObj spid="_x0000_s4109" name="Equation" r:id="rId9" imgW="1638000" imgH="228600" progId="Equation.3">
-              <p:embed/>
-            </p:oleObj>
+            <mc:AlternateContent xmlns:mc="http://schemas.openxmlformats.org/markup-compatibility/2006">
+              <mc:Choice xmlns:v="urn:schemas-microsoft-com:vml" Requires="v">
+                <p:oleObj spid="_x0000_s4123" name="Equation" r:id="rId14" imgW="1638000" imgH="228600" progId="Equation.3">
+                  <p:embed/>
+                </p:oleObj>
+              </mc:Choice>
+              <mc:Fallback>
+                <p:oleObj name="Equation" r:id="rId14" imgW="1638000" imgH="228600" progId="Equation.3">
+                  <p:embed/>
+                  <p:pic>
+                    <p:nvPicPr>
+                      <p:cNvPr id="0" name="Picture 13"/>
+                      <p:cNvPicPr>
+                        <a:picLocks noChangeAspect="1" noChangeArrowheads="1"/>
+                      </p:cNvPicPr>
+                      <p:nvPr/>
+                    </p:nvPicPr>
+                    <p:blipFill>
+                      <a:blip r:embed="rId15">
+                        <a:extLst>
+                          <a:ext uri="{28A0092B-C50C-407E-A947-70E740481C1C}">
+                            <a14:useLocalDpi xmlns:a14="http://schemas.microsoft.com/office/drawing/2010/main" val="0"/>
+                          </a:ext>
+                        </a:extLst>
+                      </a:blip>
+                      <a:srcRect/>
+                      <a:stretch>
+                        <a:fillRect/>
+                      </a:stretch>
+                    </p:blipFill>
+                    <p:spPr bwMode="auto">
+                      <a:xfrm>
+                        <a:off x="2133600" y="5486400"/>
+                        <a:ext cx="3276600" cy="457200"/>
+                      </a:xfrm>
+                      <a:prstGeom prst="rect">
+                        <a:avLst/>
+                      </a:prstGeom>
+                      <a:noFill/>
+                      <a:extLst>
+                        <a:ext uri="{909E8E84-426E-40DD-AFC4-6F175D3DCCD1}">
+                          <a14:hiddenFill xmlns:a14="http://schemas.microsoft.com/office/drawing/2010/main">
+                            <a:solidFill>
+                              <a:srgbClr val="FFFFFF"/>
+                            </a:solidFill>
+                          </a14:hiddenFill>
+                        </a:ext>
+                      </a:extLst>
+                    </p:spPr>
+                  </p:pic>
+                </p:oleObj>
+              </mc:Fallback>
+            </mc:AlternateContent>
           </a:graphicData>
         </a:graphic>
       </p:graphicFrame>
@@ -11978,9 +12664,59 @@
         </p:xfrm>
         <a:graphic>
           <a:graphicData uri="http://schemas.openxmlformats.org/presentationml/2006/ole">
-            <p:oleObj spid="_x0000_s4110" name="Equation" r:id="rId10" imgW="1790640" imgH="482400" progId="Equation.3">
-              <p:embed/>
-            </p:oleObj>
+            <mc:AlternateContent xmlns:mc="http://schemas.openxmlformats.org/markup-compatibility/2006">
+              <mc:Choice xmlns:v="urn:schemas-microsoft-com:vml" Requires="v">
+                <p:oleObj spid="_x0000_s4124" name="Equation" r:id="rId16" imgW="1790640" imgH="482400" progId="Equation.3">
+                  <p:embed/>
+                </p:oleObj>
+              </mc:Choice>
+              <mc:Fallback>
+                <p:oleObj name="Equation" r:id="rId16" imgW="1790640" imgH="482400" progId="Equation.3">
+                  <p:embed/>
+                  <p:pic>
+                    <p:nvPicPr>
+                      <p:cNvPr id="0" name="Picture 14"/>
+                      <p:cNvPicPr>
+                        <a:picLocks noChangeAspect="1" noChangeArrowheads="1"/>
+                      </p:cNvPicPr>
+                      <p:nvPr/>
+                    </p:nvPicPr>
+                    <p:blipFill>
+                      <a:blip r:embed="rId17">
+                        <a:extLst>
+                          <a:ext uri="{28A0092B-C50C-407E-A947-70E740481C1C}">
+                            <a14:useLocalDpi xmlns:a14="http://schemas.microsoft.com/office/drawing/2010/main" val="0"/>
+                          </a:ext>
+                        </a:extLst>
+                      </a:blip>
+                      <a:srcRect/>
+                      <a:stretch>
+                        <a:fillRect/>
+                      </a:stretch>
+                    </p:blipFill>
+                    <p:spPr bwMode="auto">
+                      <a:xfrm>
+                        <a:off x="1981200" y="5943600"/>
+                        <a:ext cx="3581400" cy="965200"/>
+                      </a:xfrm>
+                      <a:prstGeom prst="rect">
+                        <a:avLst/>
+                      </a:prstGeom>
+                      <a:noFill/>
+                      <a:extLst>
+                        <a:ext uri="{909E8E84-426E-40DD-AFC4-6F175D3DCCD1}">
+                          <a14:hiddenFill xmlns:a14="http://schemas.microsoft.com/office/drawing/2010/main">
+                            <a:solidFill>
+                              <a:srgbClr val="FFFFFF"/>
+                            </a:solidFill>
+                          </a14:hiddenFill>
+                        </a:ext>
+                      </a:extLst>
+                    </p:spPr>
+                  </p:pic>
+                </p:oleObj>
+              </mc:Fallback>
+            </mc:AlternateContent>
           </a:graphicData>
         </a:graphic>
       </p:graphicFrame>
@@ -12229,9 +12965,59 @@
         </p:xfrm>
         <a:graphic>
           <a:graphicData uri="http://schemas.openxmlformats.org/presentationml/2006/ole">
-            <p:oleObj spid="_x0000_s35842" name="Equation" r:id="rId4" imgW="1638000" imgH="228600" progId="Equation.3">
-              <p:embed/>
-            </p:oleObj>
+            <mc:AlternateContent xmlns:mc="http://schemas.openxmlformats.org/markup-compatibility/2006">
+              <mc:Choice xmlns:v="urn:schemas-microsoft-com:vml" Requires="v">
+                <p:oleObj spid="_x0000_s35864" name="Equation" r:id="rId4" imgW="1638000" imgH="228600" progId="Equation.3">
+                  <p:embed/>
+                </p:oleObj>
+              </mc:Choice>
+              <mc:Fallback>
+                <p:oleObj name="Equation" r:id="rId4" imgW="1638000" imgH="228600" progId="Equation.3">
+                  <p:embed/>
+                  <p:pic>
+                    <p:nvPicPr>
+                      <p:cNvPr id="0" name="Picture 2"/>
+                      <p:cNvPicPr>
+                        <a:picLocks noChangeAspect="1" noChangeArrowheads="1"/>
+                      </p:cNvPicPr>
+                      <p:nvPr/>
+                    </p:nvPicPr>
+                    <p:blipFill>
+                      <a:blip r:embed="rId5">
+                        <a:extLst>
+                          <a:ext uri="{28A0092B-C50C-407E-A947-70E740481C1C}">
+                            <a14:useLocalDpi xmlns:a14="http://schemas.microsoft.com/office/drawing/2010/main" val="0"/>
+                          </a:ext>
+                        </a:extLst>
+                      </a:blip>
+                      <a:srcRect/>
+                      <a:stretch>
+                        <a:fillRect/>
+                      </a:stretch>
+                    </p:blipFill>
+                    <p:spPr bwMode="auto">
+                      <a:xfrm>
+                        <a:off x="2019576" y="381000"/>
+                        <a:ext cx="3276600" cy="457200"/>
+                      </a:xfrm>
+                      <a:prstGeom prst="rect">
+                        <a:avLst/>
+                      </a:prstGeom>
+                      <a:noFill/>
+                      <a:extLst>
+                        <a:ext uri="{909E8E84-426E-40DD-AFC4-6F175D3DCCD1}">
+                          <a14:hiddenFill xmlns:a14="http://schemas.microsoft.com/office/drawing/2010/main">
+                            <a:solidFill>
+                              <a:srgbClr val="FFFFFF"/>
+                            </a:solidFill>
+                          </a14:hiddenFill>
+                        </a:ext>
+                      </a:extLst>
+                    </p:spPr>
+                  </p:pic>
+                </p:oleObj>
+              </mc:Fallback>
+            </mc:AlternateContent>
           </a:graphicData>
         </a:graphic>
       </p:graphicFrame>
@@ -12279,9 +13065,59 @@
         </p:xfrm>
         <a:graphic>
           <a:graphicData uri="http://schemas.openxmlformats.org/presentationml/2006/ole">
-            <p:oleObj spid="_x0000_s35843" name="Equation" r:id="rId5" imgW="1790640" imgH="482400" progId="Equation.3">
-              <p:embed/>
-            </p:oleObj>
+            <mc:AlternateContent xmlns:mc="http://schemas.openxmlformats.org/markup-compatibility/2006">
+              <mc:Choice xmlns:v="urn:schemas-microsoft-com:vml" Requires="v">
+                <p:oleObj spid="_x0000_s35865" name="Equation" r:id="rId6" imgW="1790640" imgH="482400" progId="Equation.3">
+                  <p:embed/>
+                </p:oleObj>
+              </mc:Choice>
+              <mc:Fallback>
+                <p:oleObj name="Equation" r:id="rId6" imgW="1790640" imgH="482400" progId="Equation.3">
+                  <p:embed/>
+                  <p:pic>
+                    <p:nvPicPr>
+                      <p:cNvPr id="0" name="Picture 3"/>
+                      <p:cNvPicPr>
+                        <a:picLocks noChangeAspect="1" noChangeArrowheads="1"/>
+                      </p:cNvPicPr>
+                      <p:nvPr/>
+                    </p:nvPicPr>
+                    <p:blipFill>
+                      <a:blip r:embed="rId7">
+                        <a:extLst>
+                          <a:ext uri="{28A0092B-C50C-407E-A947-70E740481C1C}">
+                            <a14:useLocalDpi xmlns:a14="http://schemas.microsoft.com/office/drawing/2010/main" val="0"/>
+                          </a:ext>
+                        </a:extLst>
+                      </a:blip>
+                      <a:srcRect/>
+                      <a:stretch>
+                        <a:fillRect/>
+                      </a:stretch>
+                    </p:blipFill>
+                    <p:spPr bwMode="auto">
+                      <a:xfrm>
+                        <a:off x="1867176" y="838200"/>
+                        <a:ext cx="3581400" cy="965200"/>
+                      </a:xfrm>
+                      <a:prstGeom prst="rect">
+                        <a:avLst/>
+                      </a:prstGeom>
+                      <a:noFill/>
+                      <a:extLst>
+                        <a:ext uri="{909E8E84-426E-40DD-AFC4-6F175D3DCCD1}">
+                          <a14:hiddenFill xmlns:a14="http://schemas.microsoft.com/office/drawing/2010/main">
+                            <a:solidFill>
+                              <a:srgbClr val="FFFFFF"/>
+                            </a:solidFill>
+                          </a14:hiddenFill>
+                        </a:ext>
+                      </a:extLst>
+                    </p:spPr>
+                  </p:pic>
+                </p:oleObj>
+              </mc:Fallback>
+            </mc:AlternateContent>
           </a:graphicData>
         </a:graphic>
       </p:graphicFrame>
@@ -12340,9 +13176,59 @@
         </p:xfrm>
         <a:graphic>
           <a:graphicData uri="http://schemas.openxmlformats.org/presentationml/2006/ole">
-            <p:oleObj spid="_x0000_s35844" name="Equation" r:id="rId6" imgW="1638000" imgH="228600" progId="Equation.3">
-              <p:embed/>
-            </p:oleObj>
+            <mc:AlternateContent xmlns:mc="http://schemas.openxmlformats.org/markup-compatibility/2006">
+              <mc:Choice xmlns:v="urn:schemas-microsoft-com:vml" Requires="v">
+                <p:oleObj spid="_x0000_s35866" name="Equation" r:id="rId8" imgW="1638000" imgH="228600" progId="Equation.3">
+                  <p:embed/>
+                </p:oleObj>
+              </mc:Choice>
+              <mc:Fallback>
+                <p:oleObj name="Equation" r:id="rId8" imgW="1638000" imgH="228600" progId="Equation.3">
+                  <p:embed/>
+                  <p:pic>
+                    <p:nvPicPr>
+                      <p:cNvPr id="0" name="Picture 4"/>
+                      <p:cNvPicPr>
+                        <a:picLocks noChangeAspect="1" noChangeArrowheads="1"/>
+                      </p:cNvPicPr>
+                      <p:nvPr/>
+                    </p:nvPicPr>
+                    <p:blipFill>
+                      <a:blip r:embed="rId5">
+                        <a:extLst>
+                          <a:ext uri="{28A0092B-C50C-407E-A947-70E740481C1C}">
+                            <a14:useLocalDpi xmlns:a14="http://schemas.microsoft.com/office/drawing/2010/main" val="0"/>
+                          </a:ext>
+                        </a:extLst>
+                      </a:blip>
+                      <a:srcRect/>
+                      <a:stretch>
+                        <a:fillRect/>
+                      </a:stretch>
+                    </p:blipFill>
+                    <p:spPr bwMode="auto">
+                      <a:xfrm>
+                        <a:off x="1066800" y="2082800"/>
+                        <a:ext cx="3276600" cy="457200"/>
+                      </a:xfrm>
+                      <a:prstGeom prst="rect">
+                        <a:avLst/>
+                      </a:prstGeom>
+                      <a:noFill/>
+                      <a:extLst>
+                        <a:ext uri="{909E8E84-426E-40DD-AFC4-6F175D3DCCD1}">
+                          <a14:hiddenFill xmlns:a14="http://schemas.microsoft.com/office/drawing/2010/main">
+                            <a:solidFill>
+                              <a:srgbClr val="FFFFFF"/>
+                            </a:solidFill>
+                          </a14:hiddenFill>
+                        </a:ext>
+                      </a:extLst>
+                    </p:spPr>
+                  </p:pic>
+                </p:oleObj>
+              </mc:Fallback>
+            </mc:AlternateContent>
           </a:graphicData>
         </a:graphic>
       </p:graphicFrame>
@@ -12390,9 +13276,59 @@
         </p:xfrm>
         <a:graphic>
           <a:graphicData uri="http://schemas.openxmlformats.org/presentationml/2006/ole">
-            <p:oleObj spid="_x0000_s35845" name="Equation" r:id="rId7" imgW="1803240" imgH="482400" progId="Equation.3">
-              <p:embed/>
-            </p:oleObj>
+            <mc:AlternateContent xmlns:mc="http://schemas.openxmlformats.org/markup-compatibility/2006">
+              <mc:Choice xmlns:v="urn:schemas-microsoft-com:vml" Requires="v">
+                <p:oleObj spid="_x0000_s35867" name="Equation" r:id="rId9" imgW="1803240" imgH="482400" progId="Equation.3">
+                  <p:embed/>
+                </p:oleObj>
+              </mc:Choice>
+              <mc:Fallback>
+                <p:oleObj name="Equation" r:id="rId9" imgW="1803240" imgH="482400" progId="Equation.3">
+                  <p:embed/>
+                  <p:pic>
+                    <p:nvPicPr>
+                      <p:cNvPr id="0" name="Picture 5"/>
+                      <p:cNvPicPr>
+                        <a:picLocks noChangeAspect="1" noChangeArrowheads="1"/>
+                      </p:cNvPicPr>
+                      <p:nvPr/>
+                    </p:nvPicPr>
+                    <p:blipFill>
+                      <a:blip r:embed="rId10">
+                        <a:extLst>
+                          <a:ext uri="{28A0092B-C50C-407E-A947-70E740481C1C}">
+                            <a14:useLocalDpi xmlns:a14="http://schemas.microsoft.com/office/drawing/2010/main" val="0"/>
+                          </a:ext>
+                        </a:extLst>
+                      </a:blip>
+                      <a:srcRect/>
+                      <a:stretch>
+                        <a:fillRect/>
+                      </a:stretch>
+                    </p:blipFill>
+                    <p:spPr bwMode="auto">
+                      <a:xfrm>
+                        <a:off x="901700" y="2540000"/>
+                        <a:ext cx="3606800" cy="965200"/>
+                      </a:xfrm>
+                      <a:prstGeom prst="rect">
+                        <a:avLst/>
+                      </a:prstGeom>
+                      <a:noFill/>
+                      <a:extLst>
+                        <a:ext uri="{909E8E84-426E-40DD-AFC4-6F175D3DCCD1}">
+                          <a14:hiddenFill xmlns:a14="http://schemas.microsoft.com/office/drawing/2010/main">
+                            <a:solidFill>
+                              <a:srgbClr val="FFFFFF"/>
+                            </a:solidFill>
+                          </a14:hiddenFill>
+                        </a:ext>
+                      </a:extLst>
+                    </p:spPr>
+                  </p:pic>
+                </p:oleObj>
+              </mc:Fallback>
+            </mc:AlternateContent>
           </a:graphicData>
         </a:graphic>
       </p:graphicFrame>
@@ -12440,9 +13376,59 @@
         </p:xfrm>
         <a:graphic>
           <a:graphicData uri="http://schemas.openxmlformats.org/presentationml/2006/ole">
-            <p:oleObj spid="_x0000_s35846" name="Equation" r:id="rId8" imgW="1523880" imgH="228600" progId="Equation.3">
-              <p:embed/>
-            </p:oleObj>
+            <mc:AlternateContent xmlns:mc="http://schemas.openxmlformats.org/markup-compatibility/2006">
+              <mc:Choice xmlns:v="urn:schemas-microsoft-com:vml" Requires="v">
+                <p:oleObj spid="_x0000_s35868" name="Equation" r:id="rId11" imgW="1523880" imgH="228600" progId="Equation.3">
+                  <p:embed/>
+                </p:oleObj>
+              </mc:Choice>
+              <mc:Fallback>
+                <p:oleObj name="Equation" r:id="rId11" imgW="1523880" imgH="228600" progId="Equation.3">
+                  <p:embed/>
+                  <p:pic>
+                    <p:nvPicPr>
+                      <p:cNvPr id="0" name="Picture 6"/>
+                      <p:cNvPicPr>
+                        <a:picLocks noChangeAspect="1" noChangeArrowheads="1"/>
+                      </p:cNvPicPr>
+                      <p:nvPr/>
+                    </p:nvPicPr>
+                    <p:blipFill>
+                      <a:blip r:embed="rId12">
+                        <a:extLst>
+                          <a:ext uri="{28A0092B-C50C-407E-A947-70E740481C1C}">
+                            <a14:useLocalDpi xmlns:a14="http://schemas.microsoft.com/office/drawing/2010/main" val="0"/>
+                          </a:ext>
+                        </a:extLst>
+                      </a:blip>
+                      <a:srcRect/>
+                      <a:stretch>
+                        <a:fillRect/>
+                      </a:stretch>
+                    </p:blipFill>
+                    <p:spPr bwMode="auto">
+                      <a:xfrm>
+                        <a:off x="5448300" y="2057400"/>
+                        <a:ext cx="3048000" cy="457200"/>
+                      </a:xfrm>
+                      <a:prstGeom prst="rect">
+                        <a:avLst/>
+                      </a:prstGeom>
+                      <a:noFill/>
+                      <a:extLst>
+                        <a:ext uri="{909E8E84-426E-40DD-AFC4-6F175D3DCCD1}">
+                          <a14:hiddenFill xmlns:a14="http://schemas.microsoft.com/office/drawing/2010/main">
+                            <a:solidFill>
+                              <a:srgbClr val="FFFFFF"/>
+                            </a:solidFill>
+                          </a14:hiddenFill>
+                        </a:ext>
+                      </a:extLst>
+                    </p:spPr>
+                  </p:pic>
+                </p:oleObj>
+              </mc:Fallback>
+            </mc:AlternateContent>
           </a:graphicData>
         </a:graphic>
       </p:graphicFrame>
@@ -12490,9 +13476,59 @@
         </p:xfrm>
         <a:graphic>
           <a:graphicData uri="http://schemas.openxmlformats.org/presentationml/2006/ole">
-            <p:oleObj spid="_x0000_s35847" name="Equation" r:id="rId9" imgW="1676160" imgH="482400" progId="Equation.3">
-              <p:embed/>
-            </p:oleObj>
+            <mc:AlternateContent xmlns:mc="http://schemas.openxmlformats.org/markup-compatibility/2006">
+              <mc:Choice xmlns:v="urn:schemas-microsoft-com:vml" Requires="v">
+                <p:oleObj spid="_x0000_s35869" name="Equation" r:id="rId13" imgW="1676160" imgH="482400" progId="Equation.3">
+                  <p:embed/>
+                </p:oleObj>
+              </mc:Choice>
+              <mc:Fallback>
+                <p:oleObj name="Equation" r:id="rId13" imgW="1676160" imgH="482400" progId="Equation.3">
+                  <p:embed/>
+                  <p:pic>
+                    <p:nvPicPr>
+                      <p:cNvPr id="0" name="Picture 7"/>
+                      <p:cNvPicPr>
+                        <a:picLocks noChangeAspect="1" noChangeArrowheads="1"/>
+                      </p:cNvPicPr>
+                      <p:nvPr/>
+                    </p:nvPicPr>
+                    <p:blipFill>
+                      <a:blip r:embed="rId14">
+                        <a:extLst>
+                          <a:ext uri="{28A0092B-C50C-407E-A947-70E740481C1C}">
+                            <a14:useLocalDpi xmlns:a14="http://schemas.microsoft.com/office/drawing/2010/main" val="0"/>
+                          </a:ext>
+                        </a:extLst>
+                      </a:blip>
+                      <a:srcRect/>
+                      <a:stretch>
+                        <a:fillRect/>
+                      </a:stretch>
+                    </p:blipFill>
+                    <p:spPr bwMode="auto">
+                      <a:xfrm>
+                        <a:off x="5295900" y="2514600"/>
+                        <a:ext cx="3352800" cy="965200"/>
+                      </a:xfrm>
+                      <a:prstGeom prst="rect">
+                        <a:avLst/>
+                      </a:prstGeom>
+                      <a:noFill/>
+                      <a:extLst>
+                        <a:ext uri="{909E8E84-426E-40DD-AFC4-6F175D3DCCD1}">
+                          <a14:hiddenFill xmlns:a14="http://schemas.microsoft.com/office/drawing/2010/main">
+                            <a:solidFill>
+                              <a:srgbClr val="FFFFFF"/>
+                            </a:solidFill>
+                          </a14:hiddenFill>
+                        </a:ext>
+                      </a:extLst>
+                    </p:spPr>
+                  </p:pic>
+                </p:oleObj>
+              </mc:Fallback>
+            </mc:AlternateContent>
           </a:graphicData>
         </a:graphic>
       </p:graphicFrame>
@@ -12540,9 +13576,59 @@
         </p:xfrm>
         <a:graphic>
           <a:graphicData uri="http://schemas.openxmlformats.org/presentationml/2006/ole">
-            <p:oleObj spid="_x0000_s35848" name="Equation" r:id="rId10" imgW="1523880" imgH="228600" progId="Equation.3">
-              <p:embed/>
-            </p:oleObj>
+            <mc:AlternateContent xmlns:mc="http://schemas.openxmlformats.org/markup-compatibility/2006">
+              <mc:Choice xmlns:v="urn:schemas-microsoft-com:vml" Requires="v">
+                <p:oleObj spid="_x0000_s35870" name="Equation" r:id="rId15" imgW="1523880" imgH="228600" progId="Equation.3">
+                  <p:embed/>
+                </p:oleObj>
+              </mc:Choice>
+              <mc:Fallback>
+                <p:oleObj name="Equation" r:id="rId15" imgW="1523880" imgH="228600" progId="Equation.3">
+                  <p:embed/>
+                  <p:pic>
+                    <p:nvPicPr>
+                      <p:cNvPr id="0" name="Picture 8"/>
+                      <p:cNvPicPr>
+                        <a:picLocks noChangeAspect="1" noChangeArrowheads="1"/>
+                      </p:cNvPicPr>
+                      <p:nvPr/>
+                    </p:nvPicPr>
+                    <p:blipFill>
+                      <a:blip r:embed="rId16">
+                        <a:extLst>
+                          <a:ext uri="{28A0092B-C50C-407E-A947-70E740481C1C}">
+                            <a14:useLocalDpi xmlns:a14="http://schemas.microsoft.com/office/drawing/2010/main" val="0"/>
+                          </a:ext>
+                        </a:extLst>
+                      </a:blip>
+                      <a:srcRect/>
+                      <a:stretch>
+                        <a:fillRect/>
+                      </a:stretch>
+                    </p:blipFill>
+                    <p:spPr bwMode="auto">
+                      <a:xfrm>
+                        <a:off x="266700" y="4445000"/>
+                        <a:ext cx="3048000" cy="457200"/>
+                      </a:xfrm>
+                      <a:prstGeom prst="rect">
+                        <a:avLst/>
+                      </a:prstGeom>
+                      <a:noFill/>
+                      <a:extLst>
+                        <a:ext uri="{909E8E84-426E-40DD-AFC4-6F175D3DCCD1}">
+                          <a14:hiddenFill xmlns:a14="http://schemas.microsoft.com/office/drawing/2010/main">
+                            <a:solidFill>
+                              <a:srgbClr val="FFFFFF"/>
+                            </a:solidFill>
+                          </a14:hiddenFill>
+                        </a:ext>
+                      </a:extLst>
+                    </p:spPr>
+                  </p:pic>
+                </p:oleObj>
+              </mc:Fallback>
+            </mc:AlternateContent>
           </a:graphicData>
         </a:graphic>
       </p:graphicFrame>
@@ -12590,9 +13676,59 @@
         </p:xfrm>
         <a:graphic>
           <a:graphicData uri="http://schemas.openxmlformats.org/presentationml/2006/ole">
-            <p:oleObj spid="_x0000_s35849" name="Equation" r:id="rId11" imgW="1676160" imgH="482400" progId="Equation.3">
-              <p:embed/>
-            </p:oleObj>
+            <mc:AlternateContent xmlns:mc="http://schemas.openxmlformats.org/markup-compatibility/2006">
+              <mc:Choice xmlns:v="urn:schemas-microsoft-com:vml" Requires="v">
+                <p:oleObj spid="_x0000_s35871" name="Equation" r:id="rId17" imgW="1676160" imgH="482400" progId="Equation.3">
+                  <p:embed/>
+                </p:oleObj>
+              </mc:Choice>
+              <mc:Fallback>
+                <p:oleObj name="Equation" r:id="rId17" imgW="1676160" imgH="482400" progId="Equation.3">
+                  <p:embed/>
+                  <p:pic>
+                    <p:nvPicPr>
+                      <p:cNvPr id="0" name="Picture 9"/>
+                      <p:cNvPicPr>
+                        <a:picLocks noChangeAspect="1" noChangeArrowheads="1"/>
+                      </p:cNvPicPr>
+                      <p:nvPr/>
+                    </p:nvPicPr>
+                    <p:blipFill>
+                      <a:blip r:embed="rId18">
+                        <a:extLst>
+                          <a:ext uri="{28A0092B-C50C-407E-A947-70E740481C1C}">
+                            <a14:useLocalDpi xmlns:a14="http://schemas.microsoft.com/office/drawing/2010/main" val="0"/>
+                          </a:ext>
+                        </a:extLst>
+                      </a:blip>
+                      <a:srcRect/>
+                      <a:stretch>
+                        <a:fillRect/>
+                      </a:stretch>
+                    </p:blipFill>
+                    <p:spPr bwMode="auto">
+                      <a:xfrm>
+                        <a:off x="114300" y="4902200"/>
+                        <a:ext cx="3352800" cy="965200"/>
+                      </a:xfrm>
+                      <a:prstGeom prst="rect">
+                        <a:avLst/>
+                      </a:prstGeom>
+                      <a:noFill/>
+                      <a:extLst>
+                        <a:ext uri="{909E8E84-426E-40DD-AFC4-6F175D3DCCD1}">
+                          <a14:hiddenFill xmlns:a14="http://schemas.microsoft.com/office/drawing/2010/main">
+                            <a:solidFill>
+                              <a:srgbClr val="FFFFFF"/>
+                            </a:solidFill>
+                          </a14:hiddenFill>
+                        </a:ext>
+                      </a:extLst>
+                    </p:spPr>
+                  </p:pic>
+                </p:oleObj>
+              </mc:Fallback>
+            </mc:AlternateContent>
           </a:graphicData>
         </a:graphic>
       </p:graphicFrame>
@@ -12640,9 +13776,59 @@
         </p:xfrm>
         <a:graphic>
           <a:graphicData uri="http://schemas.openxmlformats.org/presentationml/2006/ole">
-            <p:oleObj spid="_x0000_s35850" name="Equation" r:id="rId12" imgW="1955520" imgH="431640" progId="Equation.3">
-              <p:embed/>
-            </p:oleObj>
+            <mc:AlternateContent xmlns:mc="http://schemas.openxmlformats.org/markup-compatibility/2006">
+              <mc:Choice xmlns:v="urn:schemas-microsoft-com:vml" Requires="v">
+                <p:oleObj spid="_x0000_s35872" name="Equation" r:id="rId19" imgW="1955520" imgH="431640" progId="Equation.3">
+                  <p:embed/>
+                </p:oleObj>
+              </mc:Choice>
+              <mc:Fallback>
+                <p:oleObj name="Equation" r:id="rId19" imgW="1955520" imgH="431640" progId="Equation.3">
+                  <p:embed/>
+                  <p:pic>
+                    <p:nvPicPr>
+                      <p:cNvPr id="0" name="Picture 10"/>
+                      <p:cNvPicPr>
+                        <a:picLocks noChangeAspect="1" noChangeArrowheads="1"/>
+                      </p:cNvPicPr>
+                      <p:nvPr/>
+                    </p:nvPicPr>
+                    <p:blipFill>
+                      <a:blip r:embed="rId20">
+                        <a:extLst>
+                          <a:ext uri="{28A0092B-C50C-407E-A947-70E740481C1C}">
+                            <a14:useLocalDpi xmlns:a14="http://schemas.microsoft.com/office/drawing/2010/main" val="0"/>
+                          </a:ext>
+                        </a:extLst>
+                      </a:blip>
+                      <a:srcRect/>
+                      <a:stretch>
+                        <a:fillRect/>
+                      </a:stretch>
+                    </p:blipFill>
+                    <p:spPr bwMode="auto">
+                      <a:xfrm>
+                        <a:off x="1734671" y="3581400"/>
+                        <a:ext cx="2761129" cy="609600"/>
+                      </a:xfrm>
+                      <a:prstGeom prst="rect">
+                        <a:avLst/>
+                      </a:prstGeom>
+                      <a:noFill/>
+                      <a:extLst>
+                        <a:ext uri="{909E8E84-426E-40DD-AFC4-6F175D3DCCD1}">
+                          <a14:hiddenFill xmlns:a14="http://schemas.microsoft.com/office/drawing/2010/main">
+                            <a:solidFill>
+                              <a:srgbClr val="FFFFFF"/>
+                            </a:solidFill>
+                          </a14:hiddenFill>
+                        </a:ext>
+                      </a:extLst>
+                    </p:spPr>
+                  </p:pic>
+                </p:oleObj>
+              </mc:Fallback>
+            </mc:AlternateContent>
           </a:graphicData>
         </a:graphic>
       </p:graphicFrame>
@@ -12808,9 +13994,59 @@
         </p:xfrm>
         <a:graphic>
           <a:graphicData uri="http://schemas.openxmlformats.org/presentationml/2006/ole">
-            <p:oleObj spid="_x0000_s35851" name="Equation" r:id="rId13" imgW="1701720" imgH="228600" progId="Equation.3">
-              <p:embed/>
-            </p:oleObj>
+            <mc:AlternateContent xmlns:mc="http://schemas.openxmlformats.org/markup-compatibility/2006">
+              <mc:Choice xmlns:v="urn:schemas-microsoft-com:vml" Requires="v">
+                <p:oleObj spid="_x0000_s35873" name="Equation" r:id="rId21" imgW="1701720" imgH="228600" progId="Equation.3">
+                  <p:embed/>
+                </p:oleObj>
+              </mc:Choice>
+              <mc:Fallback>
+                <p:oleObj name="Equation" r:id="rId21" imgW="1701720" imgH="228600" progId="Equation.3">
+                  <p:embed/>
+                  <p:pic>
+                    <p:nvPicPr>
+                      <p:cNvPr id="0" name="Picture 11"/>
+                      <p:cNvPicPr>
+                        <a:picLocks noChangeAspect="1" noChangeArrowheads="1"/>
+                      </p:cNvPicPr>
+                      <p:nvPr/>
+                    </p:nvPicPr>
+                    <p:blipFill>
+                      <a:blip r:embed="rId22">
+                        <a:extLst>
+                          <a:ext uri="{28A0092B-C50C-407E-A947-70E740481C1C}">
+                            <a14:useLocalDpi xmlns:a14="http://schemas.microsoft.com/office/drawing/2010/main" val="0"/>
+                          </a:ext>
+                        </a:extLst>
+                      </a:blip>
+                      <a:srcRect/>
+                      <a:stretch>
+                        <a:fillRect/>
+                      </a:stretch>
+                    </p:blipFill>
+                    <p:spPr bwMode="auto">
+                      <a:xfrm>
+                        <a:off x="5105400" y="4495800"/>
+                        <a:ext cx="3403600" cy="457200"/>
+                      </a:xfrm>
+                      <a:prstGeom prst="rect">
+                        <a:avLst/>
+                      </a:prstGeom>
+                      <a:noFill/>
+                      <a:extLst>
+                        <a:ext uri="{909E8E84-426E-40DD-AFC4-6F175D3DCCD1}">
+                          <a14:hiddenFill xmlns:a14="http://schemas.microsoft.com/office/drawing/2010/main">
+                            <a:solidFill>
+                              <a:srgbClr val="FFFFFF"/>
+                            </a:solidFill>
+                          </a14:hiddenFill>
+                        </a:ext>
+                      </a:extLst>
+                    </p:spPr>
+                  </p:pic>
+                </p:oleObj>
+              </mc:Fallback>
+            </mc:AlternateContent>
           </a:graphicData>
         </a:graphic>
       </p:graphicFrame>
@@ -12858,9 +14094,59 @@
         </p:xfrm>
         <a:graphic>
           <a:graphicData uri="http://schemas.openxmlformats.org/presentationml/2006/ole">
-            <p:oleObj spid="_x0000_s35852" name="Equation" r:id="rId14" imgW="1968480" imgH="368280" progId="Equation.3">
-              <p:embed/>
-            </p:oleObj>
+            <mc:AlternateContent xmlns:mc="http://schemas.openxmlformats.org/markup-compatibility/2006">
+              <mc:Choice xmlns:v="urn:schemas-microsoft-com:vml" Requires="v">
+                <p:oleObj spid="_x0000_s35874" name="Equation" r:id="rId23" imgW="1968480" imgH="368280" progId="Equation.3">
+                  <p:embed/>
+                </p:oleObj>
+              </mc:Choice>
+              <mc:Fallback>
+                <p:oleObj name="Equation" r:id="rId23" imgW="1968480" imgH="368280" progId="Equation.3">
+                  <p:embed/>
+                  <p:pic>
+                    <p:nvPicPr>
+                      <p:cNvPr id="0" name="Picture 12"/>
+                      <p:cNvPicPr>
+                        <a:picLocks noChangeAspect="1" noChangeArrowheads="1"/>
+                      </p:cNvPicPr>
+                      <p:nvPr/>
+                    </p:nvPicPr>
+                    <p:blipFill>
+                      <a:blip r:embed="rId24">
+                        <a:extLst>
+                          <a:ext uri="{28A0092B-C50C-407E-A947-70E740481C1C}">
+                            <a14:useLocalDpi xmlns:a14="http://schemas.microsoft.com/office/drawing/2010/main" val="0"/>
+                          </a:ext>
+                        </a:extLst>
+                      </a:blip>
+                      <a:srcRect/>
+                      <a:stretch>
+                        <a:fillRect/>
+                      </a:stretch>
+                    </p:blipFill>
+                    <p:spPr bwMode="auto">
+                      <a:xfrm>
+                        <a:off x="4902200" y="4902200"/>
+                        <a:ext cx="3937000" cy="736600"/>
+                      </a:xfrm>
+                      <a:prstGeom prst="rect">
+                        <a:avLst/>
+                      </a:prstGeom>
+                      <a:noFill/>
+                      <a:extLst>
+                        <a:ext uri="{909E8E84-426E-40DD-AFC4-6F175D3DCCD1}">
+                          <a14:hiddenFill xmlns:a14="http://schemas.microsoft.com/office/drawing/2010/main">
+                            <a:solidFill>
+                              <a:srgbClr val="FFFFFF"/>
+                            </a:solidFill>
+                          </a14:hiddenFill>
+                        </a:ext>
+                      </a:extLst>
+                    </p:spPr>
+                  </p:pic>
+                </p:oleObj>
+              </mc:Fallback>
+            </mc:AlternateContent>
           </a:graphicData>
         </a:graphic>
       </p:graphicFrame>
@@ -13037,9 +14323,59 @@
         </p:xfrm>
         <a:graphic>
           <a:graphicData uri="http://schemas.openxmlformats.org/presentationml/2006/ole">
-            <p:oleObj spid="_x0000_s36866" name="Equation" r:id="rId4" imgW="1701720" imgH="228600" progId="Equation.3">
-              <p:embed/>
-            </p:oleObj>
+            <mc:AlternateContent xmlns:mc="http://schemas.openxmlformats.org/markup-compatibility/2006">
+              <mc:Choice xmlns:v="urn:schemas-microsoft-com:vml" Requires="v">
+                <p:oleObj spid="_x0000_s36868" name="Equation" r:id="rId4" imgW="1701720" imgH="228600" progId="Equation.3">
+                  <p:embed/>
+                </p:oleObj>
+              </mc:Choice>
+              <mc:Fallback>
+                <p:oleObj name="Equation" r:id="rId4" imgW="1701720" imgH="228600" progId="Equation.3">
+                  <p:embed/>
+                  <p:pic>
+                    <p:nvPicPr>
+                      <p:cNvPr id="0" name="Picture 2"/>
+                      <p:cNvPicPr>
+                        <a:picLocks noChangeAspect="1" noChangeArrowheads="1"/>
+                      </p:cNvPicPr>
+                      <p:nvPr/>
+                    </p:nvPicPr>
+                    <p:blipFill>
+                      <a:blip r:embed="rId5">
+                        <a:extLst>
+                          <a:ext uri="{28A0092B-C50C-407E-A947-70E740481C1C}">
+                            <a14:useLocalDpi xmlns:a14="http://schemas.microsoft.com/office/drawing/2010/main" val="0"/>
+                          </a:ext>
+                        </a:extLst>
+                      </a:blip>
+                      <a:srcRect/>
+                      <a:stretch>
+                        <a:fillRect/>
+                      </a:stretch>
+                    </p:blipFill>
+                    <p:spPr bwMode="auto">
+                      <a:xfrm>
+                        <a:off x="2159000" y="838200"/>
+                        <a:ext cx="3403600" cy="457200"/>
+                      </a:xfrm>
+                      <a:prstGeom prst="rect">
+                        <a:avLst/>
+                      </a:prstGeom>
+                      <a:noFill/>
+                      <a:extLst>
+                        <a:ext uri="{909E8E84-426E-40DD-AFC4-6F175D3DCCD1}">
+                          <a14:hiddenFill xmlns:a14="http://schemas.microsoft.com/office/drawing/2010/main">
+                            <a:solidFill>
+                              <a:srgbClr val="FFFFFF"/>
+                            </a:solidFill>
+                          </a14:hiddenFill>
+                        </a:ext>
+                      </a:extLst>
+                    </p:spPr>
+                  </p:pic>
+                </p:oleObj>
+              </mc:Fallback>
+            </mc:AlternateContent>
           </a:graphicData>
         </a:graphic>
       </p:graphicFrame>
@@ -13112,7 +14448,7 @@
           <p:nvPr/>
         </p:nvPicPr>
         <p:blipFill>
-          <a:blip r:embed="rId5" cstate="print"/>
+          <a:blip r:embed="rId6" cstate="print"/>
           <a:srcRect/>
           <a:stretch>
             <a:fillRect/>
@@ -13144,7 +14480,7 @@
           <p:nvPr/>
         </p:nvPicPr>
         <p:blipFill>
-          <a:blip r:embed="rId6" cstate="print"/>
+          <a:blip r:embed="rId7" cstate="print"/>
           <a:stretch>
             <a:fillRect/>
           </a:stretch>
@@ -13352,9 +14688,59 @@
         </p:xfrm>
         <a:graphic>
           <a:graphicData uri="http://schemas.openxmlformats.org/presentationml/2006/ole">
-            <p:oleObj spid="_x0000_s37890" name="Equation" r:id="rId4" imgW="1257120" imgH="330120" progId="Equation.3">
-              <p:embed/>
-            </p:oleObj>
+            <mc:AlternateContent xmlns:mc="http://schemas.openxmlformats.org/markup-compatibility/2006">
+              <mc:Choice xmlns:v="urn:schemas-microsoft-com:vml" Requires="v">
+                <p:oleObj spid="_x0000_s37892" name="Equation" r:id="rId4" imgW="1257120" imgH="330120" progId="Equation.3">
+                  <p:embed/>
+                </p:oleObj>
+              </mc:Choice>
+              <mc:Fallback>
+                <p:oleObj name="Equation" r:id="rId4" imgW="1257120" imgH="330120" progId="Equation.3">
+                  <p:embed/>
+                  <p:pic>
+                    <p:nvPicPr>
+                      <p:cNvPr id="0" name="Picture 2"/>
+                      <p:cNvPicPr>
+                        <a:picLocks noChangeAspect="1" noChangeArrowheads="1"/>
+                      </p:cNvPicPr>
+                      <p:nvPr/>
+                    </p:nvPicPr>
+                    <p:blipFill>
+                      <a:blip r:embed="rId5">
+                        <a:extLst>
+                          <a:ext uri="{28A0092B-C50C-407E-A947-70E740481C1C}">
+                            <a14:useLocalDpi xmlns:a14="http://schemas.microsoft.com/office/drawing/2010/main" val="0"/>
+                          </a:ext>
+                        </a:extLst>
+                      </a:blip>
+                      <a:srcRect/>
+                      <a:stretch>
+                        <a:fillRect/>
+                      </a:stretch>
+                    </p:blipFill>
+                    <p:spPr bwMode="auto">
+                      <a:xfrm>
+                        <a:off x="3657600" y="1733729"/>
+                        <a:ext cx="1743075" cy="457200"/>
+                      </a:xfrm>
+                      <a:prstGeom prst="rect">
+                        <a:avLst/>
+                      </a:prstGeom>
+                      <a:noFill/>
+                      <a:extLst>
+                        <a:ext uri="{909E8E84-426E-40DD-AFC4-6F175D3DCCD1}">
+                          <a14:hiddenFill xmlns:a14="http://schemas.microsoft.com/office/drawing/2010/main">
+                            <a:solidFill>
+                              <a:srgbClr val="FFFFFF"/>
+                            </a:solidFill>
+                          </a14:hiddenFill>
+                        </a:ext>
+                      </a:extLst>
+                    </p:spPr>
+                  </p:pic>
+                </p:oleObj>
+              </mc:Fallback>
+            </mc:AlternateContent>
           </a:graphicData>
         </a:graphic>
       </p:graphicFrame>
@@ -13411,7 +14797,7 @@
           <p:nvPr/>
         </p:nvPicPr>
         <p:blipFill>
-          <a:blip r:embed="rId5" cstate="print"/>
+          <a:blip r:embed="rId6" cstate="print"/>
           <a:srcRect/>
           <a:stretch>
             <a:fillRect/>
@@ -13838,7 +15224,15 @@
           <a:p>
             <a:r>
               <a:rPr lang="en-US" dirty="0" smtClean="0"/>
-              <a:t>P( ∏ | Y) = p(Y| ∏ ) * p(∏) </a:t>
+              <a:t>P( ∏ | Y) </a:t>
+            </a:r>
+            <a:r>
+              <a:rPr lang="en-US" dirty="0" smtClean="0"/>
+              <a:t>~ </a:t>
+            </a:r>
+            <a:r>
+              <a:rPr lang="en-US" dirty="0" smtClean="0"/>
+              <a:t>p(Y| ∏ ) * p(∏) </a:t>
             </a:r>
             <a:endParaRPr lang="en-US" dirty="0"/>
           </a:p>
@@ -14676,9 +16070,59 @@
         </p:xfrm>
         <a:graphic>
           <a:graphicData uri="http://schemas.openxmlformats.org/presentationml/2006/ole">
-            <p:oleObj spid="_x0000_s59394" name="Equation" r:id="rId4" imgW="2234880" imgH="838080" progId="Equation.3">
-              <p:embed/>
-            </p:oleObj>
+            <mc:AlternateContent xmlns:mc="http://schemas.openxmlformats.org/markup-compatibility/2006">
+              <mc:Choice xmlns:v="urn:schemas-microsoft-com:vml" Requires="v">
+                <p:oleObj spid="_x0000_s59396" name="Equation" r:id="rId4" imgW="2234880" imgH="838080" progId="Equation.3">
+                  <p:embed/>
+                </p:oleObj>
+              </mc:Choice>
+              <mc:Fallback>
+                <p:oleObj name="Equation" r:id="rId4" imgW="2234880" imgH="838080" progId="Equation.3">
+                  <p:embed/>
+                  <p:pic>
+                    <p:nvPicPr>
+                      <p:cNvPr id="0" name="Object 14"/>
+                      <p:cNvPicPr>
+                        <a:picLocks noChangeAspect="1" noChangeArrowheads="1"/>
+                      </p:cNvPicPr>
+                      <p:nvPr/>
+                    </p:nvPicPr>
+                    <p:blipFill>
+                      <a:blip r:embed="rId5">
+                        <a:extLst>
+                          <a:ext uri="{28A0092B-C50C-407E-A947-70E740481C1C}">
+                            <a14:useLocalDpi xmlns:a14="http://schemas.microsoft.com/office/drawing/2010/main" val="0"/>
+                          </a:ext>
+                        </a:extLst>
+                      </a:blip>
+                      <a:srcRect/>
+                      <a:stretch>
+                        <a:fillRect/>
+                      </a:stretch>
+                    </p:blipFill>
+                    <p:spPr bwMode="auto">
+                      <a:xfrm>
+                        <a:off x="152401" y="2391962"/>
+                        <a:ext cx="3048000" cy="1143484"/>
+                      </a:xfrm>
+                      <a:prstGeom prst="rect">
+                        <a:avLst/>
+                      </a:prstGeom>
+                      <a:noFill/>
+                      <a:extLst>
+                        <a:ext uri="{909E8E84-426E-40DD-AFC4-6F175D3DCCD1}">
+                          <a14:hiddenFill xmlns:a14="http://schemas.microsoft.com/office/drawing/2010/main">
+                            <a:solidFill>
+                              <a:srgbClr val="FFFFFF"/>
+                            </a:solidFill>
+                          </a14:hiddenFill>
+                        </a:ext>
+                      </a:extLst>
+                    </p:spPr>
+                  </p:pic>
+                </p:oleObj>
+              </mc:Fallback>
+            </mc:AlternateContent>
           </a:graphicData>
         </a:graphic>
       </p:graphicFrame>
@@ -18096,7 +19540,6 @@
               <a:rPr lang="en-US" dirty="0" smtClean="0"/>
               <a:t>Coming up: </a:t>
             </a:r>
-            <a:endParaRPr lang="en-US" dirty="0" smtClean="0"/>
           </a:p>
           <a:p>
             <a:endParaRPr lang="en-US" dirty="0" smtClean="0"/>
@@ -18112,11 +19555,7 @@
             </a:r>
             <a:r>
               <a:rPr lang="en-US" dirty="0" smtClean="0"/>
-              <a:t> approach to hypothesis testing for the 	Binomial distribution</a:t>
-            </a:r>
-            <a:r>
-              <a:rPr lang="en-US" dirty="0" smtClean="0"/>
-              <a:t>.</a:t>
+              <a:t> approach to hypothesis testing for the 	Binomial distribution.</a:t>
             </a:r>
           </a:p>
           <a:p>
@@ -18138,18 +19577,12 @@
               <a:rPr lang="en-US" dirty="0" smtClean="0"/>
               <a:t>	</a:t>
             </a:r>
-            <a:endParaRPr lang="en-US" dirty="0" smtClean="0"/>
-          </a:p>
-          <a:p>
-            <a:r>
-              <a:rPr lang="en-US" dirty="0" smtClean="0"/>
-              <a:t>	</a:t>
-            </a:r>
-            <a:r>
-              <a:rPr lang="en-US" dirty="0" smtClean="0"/>
-              <a:t>The Poisson distribution and RNA-seq</a:t>
-            </a:r>
-            <a:endParaRPr lang="en-US" dirty="0" smtClean="0"/>
+          </a:p>
+          <a:p>
+            <a:r>
+              <a:rPr lang="en-US" dirty="0" smtClean="0"/>
+              <a:t>	The Poisson distribution and RNA-seq</a:t>
+            </a:r>
           </a:p>
         </p:txBody>
       </p:sp>
@@ -21428,7 +22861,7 @@
         <p:spPr>
           <a:xfrm>
             <a:off x="1676400" y="4812268"/>
-            <a:ext cx="508473" cy="369332"/>
+            <a:ext cx="686406" cy="307777"/>
           </a:xfrm>
           <a:prstGeom prst="rect">
             <a:avLst/>
@@ -21442,10 +22875,10 @@
           <a:lstStyle/>
           <a:p>
             <a:r>
-              <a:rPr lang="en-US" dirty="0" smtClean="0"/>
-              <a:t>1/3</a:t>
-            </a:r>
-            <a:endParaRPr lang="en-US" dirty="0"/>
+              <a:rPr lang="en-US" sz="1400" dirty="0" smtClean="0"/>
+              <a:t>0.4667</a:t>
+            </a:r>
+            <a:endParaRPr lang="en-US" sz="1400" dirty="0"/>
           </a:p>
         </p:txBody>
       </p:sp>

</xml_diff>